<commit_message>
Updated lumped_element.tex with chains model
</commit_message>
<xml_diff>
--- a/Documentation/House_model_References/Pictures/New Microsoft PowerPoint Presentation.pptx
+++ b/Documentation/House_model_References/Pictures/New Microsoft PowerPoint Presentation.pptx
@@ -14,8 +14,9 @@
     <p:sldId id="263" r:id="rId8"/>
     <p:sldId id="266" r:id="rId9"/>
     <p:sldId id="265" r:id="rId10"/>
-    <p:sldId id="261" r:id="rId11"/>
-    <p:sldId id="262" r:id="rId12"/>
+    <p:sldId id="267" r:id="rId11"/>
+    <p:sldId id="261" r:id="rId12"/>
+    <p:sldId id="262" r:id="rId13"/>
   </p:sldIdLst>
   <p:sldSz cx="12192000" cy="6858000"/>
   <p:notesSz cx="6858000" cy="9144000"/>
@@ -271,7 +272,7 @@
           <a:p>
             <a:fld id="{FA475539-8058-4AF7-AB80-639FE4A10C76}" type="datetimeFigureOut">
               <a:rPr lang="en-NL" smtClean="0"/>
-              <a:t>08/23/2021</a:t>
+              <a:t>09/02/2021</a:t>
             </a:fld>
             <a:endParaRPr lang="en-NL"/>
           </a:p>
@@ -471,7 +472,7 @@
           <a:p>
             <a:fld id="{FA475539-8058-4AF7-AB80-639FE4A10C76}" type="datetimeFigureOut">
               <a:rPr lang="en-NL" smtClean="0"/>
-              <a:t>08/23/2021</a:t>
+              <a:t>09/02/2021</a:t>
             </a:fld>
             <a:endParaRPr lang="en-NL"/>
           </a:p>
@@ -681,7 +682,7 @@
           <a:p>
             <a:fld id="{FA475539-8058-4AF7-AB80-639FE4A10C76}" type="datetimeFigureOut">
               <a:rPr lang="en-NL" smtClean="0"/>
-              <a:t>08/23/2021</a:t>
+              <a:t>09/02/2021</a:t>
             </a:fld>
             <a:endParaRPr lang="en-NL"/>
           </a:p>
@@ -881,7 +882,7 @@
           <a:p>
             <a:fld id="{FA475539-8058-4AF7-AB80-639FE4A10C76}" type="datetimeFigureOut">
               <a:rPr lang="en-NL" smtClean="0"/>
-              <a:t>08/23/2021</a:t>
+              <a:t>09/02/2021</a:t>
             </a:fld>
             <a:endParaRPr lang="en-NL"/>
           </a:p>
@@ -1157,7 +1158,7 @@
           <a:p>
             <a:fld id="{FA475539-8058-4AF7-AB80-639FE4A10C76}" type="datetimeFigureOut">
               <a:rPr lang="en-NL" smtClean="0"/>
-              <a:t>08/23/2021</a:t>
+              <a:t>09/02/2021</a:t>
             </a:fld>
             <a:endParaRPr lang="en-NL"/>
           </a:p>
@@ -1425,7 +1426,7 @@
           <a:p>
             <a:fld id="{FA475539-8058-4AF7-AB80-639FE4A10C76}" type="datetimeFigureOut">
               <a:rPr lang="en-NL" smtClean="0"/>
-              <a:t>08/23/2021</a:t>
+              <a:t>09/02/2021</a:t>
             </a:fld>
             <a:endParaRPr lang="en-NL"/>
           </a:p>
@@ -1840,7 +1841,7 @@
           <a:p>
             <a:fld id="{FA475539-8058-4AF7-AB80-639FE4A10C76}" type="datetimeFigureOut">
               <a:rPr lang="en-NL" smtClean="0"/>
-              <a:t>08/23/2021</a:t>
+              <a:t>09/02/2021</a:t>
             </a:fld>
             <a:endParaRPr lang="en-NL"/>
           </a:p>
@@ -1982,7 +1983,7 @@
           <a:p>
             <a:fld id="{FA475539-8058-4AF7-AB80-639FE4A10C76}" type="datetimeFigureOut">
               <a:rPr lang="en-NL" smtClean="0"/>
-              <a:t>08/23/2021</a:t>
+              <a:t>09/02/2021</a:t>
             </a:fld>
             <a:endParaRPr lang="en-NL"/>
           </a:p>
@@ -2095,7 +2096,7 @@
           <a:p>
             <a:fld id="{FA475539-8058-4AF7-AB80-639FE4A10C76}" type="datetimeFigureOut">
               <a:rPr lang="en-NL" smtClean="0"/>
-              <a:t>08/23/2021</a:t>
+              <a:t>09/02/2021</a:t>
             </a:fld>
             <a:endParaRPr lang="en-NL"/>
           </a:p>
@@ -2408,7 +2409,7 @@
           <a:p>
             <a:fld id="{FA475539-8058-4AF7-AB80-639FE4A10C76}" type="datetimeFigureOut">
               <a:rPr lang="en-NL" smtClean="0"/>
-              <a:t>08/23/2021</a:t>
+              <a:t>09/02/2021</a:t>
             </a:fld>
             <a:endParaRPr lang="en-NL"/>
           </a:p>
@@ -2697,7 +2698,7 @@
           <a:p>
             <a:fld id="{FA475539-8058-4AF7-AB80-639FE4A10C76}" type="datetimeFigureOut">
               <a:rPr lang="en-NL" smtClean="0"/>
-              <a:t>08/23/2021</a:t>
+              <a:t>09/02/2021</a:t>
             </a:fld>
             <a:endParaRPr lang="en-NL"/>
           </a:p>
@@ -2940,7 +2941,7 @@
           <a:p>
             <a:fld id="{FA475539-8058-4AF7-AB80-639FE4A10C76}" type="datetimeFigureOut">
               <a:rPr lang="en-NL" smtClean="0"/>
-              <a:t>08/23/2021</a:t>
+              <a:t>09/02/2021</a:t>
             </a:fld>
             <a:endParaRPr lang="en-NL"/>
           </a:p>
@@ -5162,6 +5163,2645 @@
           <a:chExt cx="0" cy="0"/>
         </a:xfrm>
       </p:grpSpPr>
+      <p:sp>
+        <p:nvSpPr>
+          <p:cNvPr id="245" name="TextBox 244">
+            <a:extLst>
+              <a:ext uri="{FF2B5EF4-FFF2-40B4-BE49-F238E27FC236}">
+                <a16:creationId xmlns:a16="http://schemas.microsoft.com/office/drawing/2014/main" id="{BAD992C5-A9AE-4F89-8527-32FFECA3ACE4}"/>
+              </a:ext>
+            </a:extLst>
+          </p:cNvPr>
+          <p:cNvSpPr txBox="1"/>
+          <p:nvPr/>
+        </p:nvSpPr>
+        <p:spPr>
+          <a:xfrm>
+            <a:off x="5346917" y="3581440"/>
+            <a:ext cx="660758" cy="523220"/>
+          </a:xfrm>
+          <a:prstGeom prst="rect">
+            <a:avLst/>
+          </a:prstGeom>
+          <a:noFill/>
+        </p:spPr>
+        <p:txBody>
+          <a:bodyPr wrap="none" rtlCol="0">
+            <a:spAutoFit/>
+          </a:bodyPr>
+          <a:lstStyle/>
+          <a:p>
+            <a:r>
+              <a:rPr lang="en-US" sz="2800" dirty="0"/>
+              <a:t>C</a:t>
+            </a:r>
+            <a:r>
+              <a:rPr lang="en-US" sz="2800" baseline="-25000" dirty="0"/>
+              <a:t>1   </a:t>
+            </a:r>
+          </a:p>
+        </p:txBody>
+      </p:sp>
+      <p:sp>
+        <p:nvSpPr>
+          <p:cNvPr id="244" name="TextBox 243">
+            <a:extLst>
+              <a:ext uri="{FF2B5EF4-FFF2-40B4-BE49-F238E27FC236}">
+                <a16:creationId xmlns:a16="http://schemas.microsoft.com/office/drawing/2014/main" id="{0DCC33BC-69F2-45CA-893C-CA719D02A126}"/>
+              </a:ext>
+            </a:extLst>
+          </p:cNvPr>
+          <p:cNvSpPr txBox="1"/>
+          <p:nvPr/>
+        </p:nvSpPr>
+        <p:spPr>
+          <a:xfrm>
+            <a:off x="2864358" y="3581440"/>
+            <a:ext cx="497252" cy="523220"/>
+          </a:xfrm>
+          <a:prstGeom prst="rect">
+            <a:avLst/>
+          </a:prstGeom>
+          <a:noFill/>
+        </p:spPr>
+        <p:txBody>
+          <a:bodyPr wrap="none" rtlCol="0">
+            <a:spAutoFit/>
+          </a:bodyPr>
+          <a:lstStyle/>
+          <a:p>
+            <a:r>
+              <a:rPr lang="en-US" sz="2800" dirty="0"/>
+              <a:t>C</a:t>
+            </a:r>
+            <a:r>
+              <a:rPr lang="en-US" sz="2800" baseline="-25000" dirty="0"/>
+              <a:t>0</a:t>
+            </a:r>
+          </a:p>
+        </p:txBody>
+      </p:sp>
+      <p:cxnSp>
+        <p:nvCxnSpPr>
+          <p:cNvPr id="4" name="Straight Connector 3">
+            <a:extLst>
+              <a:ext uri="{FF2B5EF4-FFF2-40B4-BE49-F238E27FC236}">
+                <a16:creationId xmlns:a16="http://schemas.microsoft.com/office/drawing/2014/main" id="{2AF10456-DB7E-4596-906A-2A1E09E8FDFB}"/>
+              </a:ext>
+            </a:extLst>
+          </p:cNvPr>
+          <p:cNvCxnSpPr>
+            <a:cxnSpLocks/>
+            <a:endCxn id="92" idx="0"/>
+          </p:cNvCxnSpPr>
+          <p:nvPr/>
+        </p:nvCxnSpPr>
+        <p:spPr>
+          <a:xfrm>
+            <a:off x="6112538" y="3462531"/>
+            <a:ext cx="0" cy="341999"/>
+          </a:xfrm>
+          <a:prstGeom prst="line">
+            <a:avLst/>
+          </a:prstGeom>
+          <a:ln w="19050" cap="flat">
+            <a:solidFill>
+              <a:schemeClr val="tx1"/>
+            </a:solidFill>
+            <a:headEnd type="oval"/>
+          </a:ln>
+        </p:spPr>
+        <p:style>
+          <a:lnRef idx="1">
+            <a:schemeClr val="accent1"/>
+          </a:lnRef>
+          <a:fillRef idx="0">
+            <a:schemeClr val="accent1"/>
+          </a:fillRef>
+          <a:effectRef idx="0">
+            <a:schemeClr val="accent1"/>
+          </a:effectRef>
+          <a:fontRef idx="minor">
+            <a:schemeClr val="tx1"/>
+          </a:fontRef>
+        </p:style>
+      </p:cxnSp>
+      <p:cxnSp>
+        <p:nvCxnSpPr>
+          <p:cNvPr id="82" name="Straight Connector 81">
+            <a:extLst>
+              <a:ext uri="{FF2B5EF4-FFF2-40B4-BE49-F238E27FC236}">
+                <a16:creationId xmlns:a16="http://schemas.microsoft.com/office/drawing/2014/main" id="{125E4EC3-6ED6-4C78-B39C-E088F6F105B3}"/>
+              </a:ext>
+            </a:extLst>
+          </p:cNvPr>
+          <p:cNvCxnSpPr>
+            <a:cxnSpLocks/>
+            <a:stCxn id="112" idx="0"/>
+            <a:endCxn id="92" idx="2"/>
+          </p:cNvCxnSpPr>
+          <p:nvPr/>
+        </p:nvCxnSpPr>
+        <p:spPr>
+          <a:xfrm flipH="1" flipV="1">
+            <a:off x="6112538" y="3984530"/>
+            <a:ext cx="1094" cy="392917"/>
+          </a:xfrm>
+          <a:prstGeom prst="line">
+            <a:avLst/>
+          </a:prstGeom>
+          <a:ln w="19050" cap="flat">
+            <a:solidFill>
+              <a:schemeClr val="tx1"/>
+            </a:solidFill>
+            <a:headEnd type="none"/>
+          </a:ln>
+        </p:spPr>
+        <p:style>
+          <a:lnRef idx="1">
+            <a:schemeClr val="accent1"/>
+          </a:lnRef>
+          <a:fillRef idx="0">
+            <a:schemeClr val="accent1"/>
+          </a:fillRef>
+          <a:effectRef idx="0">
+            <a:schemeClr val="accent1"/>
+          </a:effectRef>
+          <a:fontRef idx="minor">
+            <a:schemeClr val="tx1"/>
+          </a:fontRef>
+        </p:style>
+      </p:cxnSp>
+      <p:grpSp>
+        <p:nvGrpSpPr>
+          <p:cNvPr id="114" name="Group 113">
+            <a:extLst>
+              <a:ext uri="{FF2B5EF4-FFF2-40B4-BE49-F238E27FC236}">
+                <a16:creationId xmlns:a16="http://schemas.microsoft.com/office/drawing/2014/main" id="{CCE19251-9538-4E4A-B33B-B007A813AA28}"/>
+              </a:ext>
+            </a:extLst>
+          </p:cNvPr>
+          <p:cNvGrpSpPr/>
+          <p:nvPr/>
+        </p:nvGrpSpPr>
+        <p:grpSpPr>
+          <a:xfrm>
+            <a:off x="5823588" y="3786530"/>
+            <a:ext cx="587606" cy="216000"/>
+            <a:chOff x="6300555" y="1303873"/>
+            <a:chExt cx="587606" cy="216000"/>
+          </a:xfrm>
+        </p:grpSpPr>
+        <p:sp>
+          <p:nvSpPr>
+            <p:cNvPr id="92" name="Rectangle 91">
+              <a:extLst>
+                <a:ext uri="{FF2B5EF4-FFF2-40B4-BE49-F238E27FC236}">
+                  <a16:creationId xmlns:a16="http://schemas.microsoft.com/office/drawing/2014/main" id="{6EB3847D-2A76-4BAE-891B-D0781F1A6DB1}"/>
+                </a:ext>
+              </a:extLst>
+            </p:cNvPr>
+            <p:cNvSpPr/>
+            <p:nvPr/>
+          </p:nvSpPr>
+          <p:spPr>
+            <a:xfrm>
+              <a:off x="6319505" y="1321873"/>
+              <a:ext cx="540000" cy="180000"/>
+            </a:xfrm>
+            <a:prstGeom prst="rect">
+              <a:avLst/>
+            </a:prstGeom>
+            <a:noFill/>
+            <a:ln w="19050">
+              <a:solidFill>
+                <a:schemeClr val="tx1"/>
+              </a:solidFill>
+            </a:ln>
+          </p:spPr>
+          <p:style>
+            <a:lnRef idx="2">
+              <a:schemeClr val="accent1">
+                <a:shade val="50000"/>
+              </a:schemeClr>
+            </a:lnRef>
+            <a:fillRef idx="1">
+              <a:schemeClr val="accent1"/>
+            </a:fillRef>
+            <a:effectRef idx="0">
+              <a:schemeClr val="accent1"/>
+            </a:effectRef>
+            <a:fontRef idx="minor">
+              <a:schemeClr val="lt1"/>
+            </a:fontRef>
+          </p:style>
+          <p:txBody>
+            <a:bodyPr rtlCol="0" anchor="ctr"/>
+            <a:lstStyle/>
+            <a:p>
+              <a:pPr algn="ctr"/>
+              <a:endParaRPr lang="en-US"/>
+            </a:p>
+          </p:txBody>
+        </p:sp>
+        <p:sp>
+          <p:nvSpPr>
+            <p:cNvPr id="109" name="Rectangle 108">
+              <a:extLst>
+                <a:ext uri="{FF2B5EF4-FFF2-40B4-BE49-F238E27FC236}">
+                  <a16:creationId xmlns:a16="http://schemas.microsoft.com/office/drawing/2014/main" id="{B2761633-F9CB-4C33-BB21-3EB83CCD2305}"/>
+                </a:ext>
+              </a:extLst>
+            </p:cNvPr>
+            <p:cNvSpPr/>
+            <p:nvPr/>
+          </p:nvSpPr>
+          <p:spPr>
+            <a:xfrm>
+              <a:off x="6300555" y="1303873"/>
+              <a:ext cx="36000" cy="216000"/>
+            </a:xfrm>
+            <a:prstGeom prst="rect">
+              <a:avLst/>
+            </a:prstGeom>
+            <a:solidFill>
+              <a:schemeClr val="bg1"/>
+            </a:solidFill>
+            <a:ln w="19050">
+              <a:noFill/>
+            </a:ln>
+          </p:spPr>
+          <p:style>
+            <a:lnRef idx="2">
+              <a:schemeClr val="accent1">
+                <a:shade val="50000"/>
+              </a:schemeClr>
+            </a:lnRef>
+            <a:fillRef idx="1">
+              <a:schemeClr val="accent1"/>
+            </a:fillRef>
+            <a:effectRef idx="0">
+              <a:schemeClr val="accent1"/>
+            </a:effectRef>
+            <a:fontRef idx="minor">
+              <a:schemeClr val="lt1"/>
+            </a:fontRef>
+          </p:style>
+          <p:txBody>
+            <a:bodyPr rtlCol="0" anchor="ctr"/>
+            <a:lstStyle/>
+            <a:p>
+              <a:pPr algn="ctr"/>
+              <a:endParaRPr lang="en-US"/>
+            </a:p>
+          </p:txBody>
+        </p:sp>
+        <p:sp>
+          <p:nvSpPr>
+            <p:cNvPr id="110" name="Rectangle 109">
+              <a:extLst>
+                <a:ext uri="{FF2B5EF4-FFF2-40B4-BE49-F238E27FC236}">
+                  <a16:creationId xmlns:a16="http://schemas.microsoft.com/office/drawing/2014/main" id="{71C74FC8-F53F-40E2-BA98-DCD3B8403B21}"/>
+                </a:ext>
+              </a:extLst>
+            </p:cNvPr>
+            <p:cNvSpPr/>
+            <p:nvPr/>
+          </p:nvSpPr>
+          <p:spPr>
+            <a:xfrm>
+              <a:off x="6852161" y="1303873"/>
+              <a:ext cx="36000" cy="216000"/>
+            </a:xfrm>
+            <a:prstGeom prst="rect">
+              <a:avLst/>
+            </a:prstGeom>
+            <a:solidFill>
+              <a:schemeClr val="bg1"/>
+            </a:solidFill>
+            <a:ln w="19050">
+              <a:noFill/>
+            </a:ln>
+          </p:spPr>
+          <p:style>
+            <a:lnRef idx="2">
+              <a:schemeClr val="accent1">
+                <a:shade val="50000"/>
+              </a:schemeClr>
+            </a:lnRef>
+            <a:fillRef idx="1">
+              <a:schemeClr val="accent1"/>
+            </a:fillRef>
+            <a:effectRef idx="0">
+              <a:schemeClr val="accent1"/>
+            </a:effectRef>
+            <a:fontRef idx="minor">
+              <a:schemeClr val="lt1"/>
+            </a:fontRef>
+          </p:style>
+          <p:txBody>
+            <a:bodyPr rtlCol="0" anchor="ctr"/>
+            <a:lstStyle/>
+            <a:p>
+              <a:pPr algn="ctr"/>
+              <a:endParaRPr lang="en-US"/>
+            </a:p>
+          </p:txBody>
+        </p:sp>
+      </p:grpSp>
+      <p:grpSp>
+        <p:nvGrpSpPr>
+          <p:cNvPr id="113" name="Group 112">
+            <a:extLst>
+              <a:ext uri="{FF2B5EF4-FFF2-40B4-BE49-F238E27FC236}">
+                <a16:creationId xmlns:a16="http://schemas.microsoft.com/office/drawing/2014/main" id="{DA15EF6B-09AD-4168-88FA-ACFF7555E727}"/>
+              </a:ext>
+            </a:extLst>
+          </p:cNvPr>
+          <p:cNvGrpSpPr/>
+          <p:nvPr/>
+        </p:nvGrpSpPr>
+        <p:grpSpPr>
+          <a:xfrm>
+            <a:off x="5842666" y="4377447"/>
+            <a:ext cx="540000" cy="210827"/>
+            <a:chOff x="5825034" y="3354113"/>
+            <a:chExt cx="540000" cy="210827"/>
+          </a:xfrm>
+        </p:grpSpPr>
+        <p:grpSp>
+          <p:nvGrpSpPr>
+            <p:cNvPr id="64" name="Group 208">
+              <a:extLst>
+                <a:ext uri="{FF2B5EF4-FFF2-40B4-BE49-F238E27FC236}">
+                  <a16:creationId xmlns:a16="http://schemas.microsoft.com/office/drawing/2014/main" id="{968A4536-2235-47EB-A25A-51F9AE4CE923}"/>
+                </a:ext>
+              </a:extLst>
+            </p:cNvPr>
+            <p:cNvGrpSpPr>
+              <a:grpSpLocks noChangeAspect="1"/>
+            </p:cNvGrpSpPr>
+            <p:nvPr/>
+          </p:nvGrpSpPr>
+          <p:grpSpPr bwMode="auto">
+            <a:xfrm>
+              <a:off x="5825034" y="3383065"/>
+              <a:ext cx="540000" cy="181875"/>
+              <a:chOff x="304800" y="1676931"/>
+              <a:chExt cx="457200" cy="153457"/>
+            </a:xfrm>
+          </p:grpSpPr>
+          <p:cxnSp>
+            <p:nvCxnSpPr>
+              <p:cNvPr id="65" name="Straight Connector 64">
+                <a:extLst>
+                  <a:ext uri="{FF2B5EF4-FFF2-40B4-BE49-F238E27FC236}">
+                    <a16:creationId xmlns:a16="http://schemas.microsoft.com/office/drawing/2014/main" id="{7F2D108A-7EF8-43AB-81EE-57B5950CFAD8}"/>
+                  </a:ext>
+                </a:extLst>
+              </p:cNvPr>
+              <p:cNvCxnSpPr/>
+              <p:nvPr/>
+            </p:nvCxnSpPr>
+            <p:spPr>
+              <a:xfrm>
+                <a:off x="304800" y="1676931"/>
+                <a:ext cx="457200" cy="1582"/>
+              </a:xfrm>
+              <a:prstGeom prst="line">
+                <a:avLst/>
+              </a:prstGeom>
+              <a:ln w="19050">
+                <a:solidFill>
+                  <a:schemeClr val="tx1"/>
+                </a:solidFill>
+              </a:ln>
+            </p:spPr>
+            <p:style>
+              <a:lnRef idx="1">
+                <a:schemeClr val="accent1"/>
+              </a:lnRef>
+              <a:fillRef idx="0">
+                <a:schemeClr val="accent1"/>
+              </a:fillRef>
+              <a:effectRef idx="0">
+                <a:schemeClr val="accent1"/>
+              </a:effectRef>
+              <a:fontRef idx="minor">
+                <a:schemeClr val="tx1"/>
+              </a:fontRef>
+            </p:style>
+          </p:cxnSp>
+          <p:cxnSp>
+            <p:nvCxnSpPr>
+              <p:cNvPr id="66" name="Straight Connector 65">
+                <a:extLst>
+                  <a:ext uri="{FF2B5EF4-FFF2-40B4-BE49-F238E27FC236}">
+                    <a16:creationId xmlns:a16="http://schemas.microsoft.com/office/drawing/2014/main" id="{F5716AE3-6625-49DB-8B25-568A445CDCF7}"/>
+                  </a:ext>
+                </a:extLst>
+              </p:cNvPr>
+              <p:cNvCxnSpPr/>
+              <p:nvPr/>
+            </p:nvCxnSpPr>
+            <p:spPr>
+              <a:xfrm>
+                <a:off x="457200" y="1828806"/>
+                <a:ext cx="153988" cy="1582"/>
+              </a:xfrm>
+              <a:prstGeom prst="line">
+                <a:avLst/>
+              </a:prstGeom>
+              <a:ln w="19050">
+                <a:solidFill>
+                  <a:schemeClr val="tx1"/>
+                </a:solidFill>
+              </a:ln>
+            </p:spPr>
+            <p:style>
+              <a:lnRef idx="1">
+                <a:schemeClr val="accent1"/>
+              </a:lnRef>
+              <a:fillRef idx="0">
+                <a:schemeClr val="accent1"/>
+              </a:fillRef>
+              <a:effectRef idx="0">
+                <a:schemeClr val="accent1"/>
+              </a:effectRef>
+              <a:fontRef idx="minor">
+                <a:schemeClr val="tx1"/>
+              </a:fontRef>
+            </p:style>
+          </p:cxnSp>
+          <p:cxnSp>
+            <p:nvCxnSpPr>
+              <p:cNvPr id="68" name="Straight Connector 67">
+                <a:extLst>
+                  <a:ext uri="{FF2B5EF4-FFF2-40B4-BE49-F238E27FC236}">
+                    <a16:creationId xmlns:a16="http://schemas.microsoft.com/office/drawing/2014/main" id="{E0897441-31AD-46B6-8E68-0452611C8FA1}"/>
+                  </a:ext>
+                </a:extLst>
+              </p:cNvPr>
+              <p:cNvCxnSpPr/>
+              <p:nvPr/>
+            </p:nvCxnSpPr>
+            <p:spPr>
+              <a:xfrm>
+                <a:off x="381000" y="1752869"/>
+                <a:ext cx="304800" cy="1582"/>
+              </a:xfrm>
+              <a:prstGeom prst="line">
+                <a:avLst/>
+              </a:prstGeom>
+              <a:ln w="19050">
+                <a:solidFill>
+                  <a:schemeClr val="tx1"/>
+                </a:solidFill>
+              </a:ln>
+            </p:spPr>
+            <p:style>
+              <a:lnRef idx="1">
+                <a:schemeClr val="accent1"/>
+              </a:lnRef>
+              <a:fillRef idx="0">
+                <a:schemeClr val="accent1"/>
+              </a:fillRef>
+              <a:effectRef idx="0">
+                <a:schemeClr val="accent1"/>
+              </a:effectRef>
+              <a:fontRef idx="minor">
+                <a:schemeClr val="tx1"/>
+              </a:fontRef>
+            </p:style>
+          </p:cxnSp>
+        </p:grpSp>
+        <p:sp>
+          <p:nvSpPr>
+            <p:cNvPr id="112" name="Oval 111">
+              <a:extLst>
+                <a:ext uri="{FF2B5EF4-FFF2-40B4-BE49-F238E27FC236}">
+                  <a16:creationId xmlns:a16="http://schemas.microsoft.com/office/drawing/2014/main" id="{FA9FFD42-BD4D-43CF-8D6F-042510DDA070}"/>
+                </a:ext>
+              </a:extLst>
+            </p:cNvPr>
+            <p:cNvSpPr/>
+            <p:nvPr/>
+          </p:nvSpPr>
+          <p:spPr>
+            <a:xfrm>
+              <a:off x="6073140" y="3354113"/>
+              <a:ext cx="45719" cy="45719"/>
+            </a:xfrm>
+            <a:prstGeom prst="ellipse">
+              <a:avLst/>
+            </a:prstGeom>
+            <a:solidFill>
+              <a:schemeClr val="tx1"/>
+            </a:solidFill>
+            <a:ln>
+              <a:noFill/>
+            </a:ln>
+          </p:spPr>
+          <p:style>
+            <a:lnRef idx="2">
+              <a:schemeClr val="accent1">
+                <a:shade val="50000"/>
+              </a:schemeClr>
+            </a:lnRef>
+            <a:fillRef idx="1">
+              <a:schemeClr val="accent1"/>
+            </a:fillRef>
+            <a:effectRef idx="0">
+              <a:schemeClr val="accent1"/>
+            </a:effectRef>
+            <a:fontRef idx="minor">
+              <a:schemeClr val="lt1"/>
+            </a:fontRef>
+          </p:style>
+          <p:txBody>
+            <a:bodyPr rtlCol="0" anchor="ctr"/>
+            <a:lstStyle/>
+            <a:p>
+              <a:pPr algn="ctr"/>
+              <a:endParaRPr lang="en-US"/>
+            </a:p>
+          </p:txBody>
+        </p:sp>
+      </p:grpSp>
+      <p:cxnSp>
+        <p:nvCxnSpPr>
+          <p:cNvPr id="140" name="Straight Connector 139">
+            <a:extLst>
+              <a:ext uri="{FF2B5EF4-FFF2-40B4-BE49-F238E27FC236}">
+                <a16:creationId xmlns:a16="http://schemas.microsoft.com/office/drawing/2014/main" id="{6CF55845-6ECC-4426-A929-23C49DE4815F}"/>
+              </a:ext>
+            </a:extLst>
+          </p:cNvPr>
+          <p:cNvCxnSpPr>
+            <a:cxnSpLocks/>
+            <a:stCxn id="147" idx="0"/>
+            <a:endCxn id="142" idx="2"/>
+          </p:cNvCxnSpPr>
+          <p:nvPr/>
+        </p:nvCxnSpPr>
+        <p:spPr>
+          <a:xfrm flipV="1">
+            <a:off x="3711318" y="3989586"/>
+            <a:ext cx="6990" cy="385986"/>
+          </a:xfrm>
+          <a:prstGeom prst="line">
+            <a:avLst/>
+          </a:prstGeom>
+          <a:ln w="19050" cap="flat">
+            <a:solidFill>
+              <a:schemeClr val="tx1"/>
+            </a:solidFill>
+            <a:headEnd type="none"/>
+          </a:ln>
+        </p:spPr>
+        <p:style>
+          <a:lnRef idx="1">
+            <a:schemeClr val="accent1"/>
+          </a:lnRef>
+          <a:fillRef idx="0">
+            <a:schemeClr val="accent1"/>
+          </a:fillRef>
+          <a:effectRef idx="0">
+            <a:schemeClr val="accent1"/>
+          </a:effectRef>
+          <a:fontRef idx="minor">
+            <a:schemeClr val="tx1"/>
+          </a:fontRef>
+        </p:style>
+      </p:cxnSp>
+      <p:grpSp>
+        <p:nvGrpSpPr>
+          <p:cNvPr id="141" name="Group 140">
+            <a:extLst>
+              <a:ext uri="{FF2B5EF4-FFF2-40B4-BE49-F238E27FC236}">
+                <a16:creationId xmlns:a16="http://schemas.microsoft.com/office/drawing/2014/main" id="{0A93134F-CDAD-4FF9-9991-CC0D1361FB7F}"/>
+              </a:ext>
+            </a:extLst>
+          </p:cNvPr>
+          <p:cNvGrpSpPr/>
+          <p:nvPr/>
+        </p:nvGrpSpPr>
+        <p:grpSpPr>
+          <a:xfrm>
+            <a:off x="3429358" y="3791586"/>
+            <a:ext cx="587606" cy="216000"/>
+            <a:chOff x="6300555" y="1303873"/>
+            <a:chExt cx="587606" cy="216000"/>
+          </a:xfrm>
+        </p:grpSpPr>
+        <p:sp>
+          <p:nvSpPr>
+            <p:cNvPr id="142" name="Rectangle 141">
+              <a:extLst>
+                <a:ext uri="{FF2B5EF4-FFF2-40B4-BE49-F238E27FC236}">
+                  <a16:creationId xmlns:a16="http://schemas.microsoft.com/office/drawing/2014/main" id="{C42B0388-AE01-492C-8A1D-5CC795DDF87F}"/>
+                </a:ext>
+              </a:extLst>
+            </p:cNvPr>
+            <p:cNvSpPr/>
+            <p:nvPr/>
+          </p:nvSpPr>
+          <p:spPr>
+            <a:xfrm>
+              <a:off x="6319505" y="1321873"/>
+              <a:ext cx="540000" cy="180000"/>
+            </a:xfrm>
+            <a:prstGeom prst="rect">
+              <a:avLst/>
+            </a:prstGeom>
+            <a:noFill/>
+            <a:ln w="19050">
+              <a:solidFill>
+                <a:schemeClr val="tx1"/>
+              </a:solidFill>
+            </a:ln>
+          </p:spPr>
+          <p:style>
+            <a:lnRef idx="2">
+              <a:schemeClr val="accent1">
+                <a:shade val="50000"/>
+              </a:schemeClr>
+            </a:lnRef>
+            <a:fillRef idx="1">
+              <a:schemeClr val="accent1"/>
+            </a:fillRef>
+            <a:effectRef idx="0">
+              <a:schemeClr val="accent1"/>
+            </a:effectRef>
+            <a:fontRef idx="minor">
+              <a:schemeClr val="lt1"/>
+            </a:fontRef>
+          </p:style>
+          <p:txBody>
+            <a:bodyPr rtlCol="0" anchor="ctr"/>
+            <a:lstStyle/>
+            <a:p>
+              <a:pPr algn="ctr"/>
+              <a:endParaRPr lang="en-US"/>
+            </a:p>
+          </p:txBody>
+        </p:sp>
+        <p:sp>
+          <p:nvSpPr>
+            <p:cNvPr id="143" name="Rectangle 142">
+              <a:extLst>
+                <a:ext uri="{FF2B5EF4-FFF2-40B4-BE49-F238E27FC236}">
+                  <a16:creationId xmlns:a16="http://schemas.microsoft.com/office/drawing/2014/main" id="{E1B1A115-1BE4-486E-AFED-A314880666D3}"/>
+                </a:ext>
+              </a:extLst>
+            </p:cNvPr>
+            <p:cNvSpPr/>
+            <p:nvPr/>
+          </p:nvSpPr>
+          <p:spPr>
+            <a:xfrm>
+              <a:off x="6300555" y="1303873"/>
+              <a:ext cx="36000" cy="216000"/>
+            </a:xfrm>
+            <a:prstGeom prst="rect">
+              <a:avLst/>
+            </a:prstGeom>
+            <a:solidFill>
+              <a:schemeClr val="bg1"/>
+            </a:solidFill>
+            <a:ln w="19050">
+              <a:noFill/>
+            </a:ln>
+          </p:spPr>
+          <p:style>
+            <a:lnRef idx="2">
+              <a:schemeClr val="accent1">
+                <a:shade val="50000"/>
+              </a:schemeClr>
+            </a:lnRef>
+            <a:fillRef idx="1">
+              <a:schemeClr val="accent1"/>
+            </a:fillRef>
+            <a:effectRef idx="0">
+              <a:schemeClr val="accent1"/>
+            </a:effectRef>
+            <a:fontRef idx="minor">
+              <a:schemeClr val="lt1"/>
+            </a:fontRef>
+          </p:style>
+          <p:txBody>
+            <a:bodyPr rtlCol="0" anchor="ctr"/>
+            <a:lstStyle/>
+            <a:p>
+              <a:pPr algn="ctr"/>
+              <a:endParaRPr lang="en-US"/>
+            </a:p>
+          </p:txBody>
+        </p:sp>
+        <p:sp>
+          <p:nvSpPr>
+            <p:cNvPr id="144" name="Rectangle 143">
+              <a:extLst>
+                <a:ext uri="{FF2B5EF4-FFF2-40B4-BE49-F238E27FC236}">
+                  <a16:creationId xmlns:a16="http://schemas.microsoft.com/office/drawing/2014/main" id="{4C92E2DD-314C-4A18-8FFC-39B5E49616DE}"/>
+                </a:ext>
+              </a:extLst>
+            </p:cNvPr>
+            <p:cNvSpPr/>
+            <p:nvPr/>
+          </p:nvSpPr>
+          <p:spPr>
+            <a:xfrm>
+              <a:off x="6852161" y="1303873"/>
+              <a:ext cx="36000" cy="216000"/>
+            </a:xfrm>
+            <a:prstGeom prst="rect">
+              <a:avLst/>
+            </a:prstGeom>
+            <a:solidFill>
+              <a:schemeClr val="bg1"/>
+            </a:solidFill>
+            <a:ln w="19050">
+              <a:noFill/>
+            </a:ln>
+          </p:spPr>
+          <p:style>
+            <a:lnRef idx="2">
+              <a:schemeClr val="accent1">
+                <a:shade val="50000"/>
+              </a:schemeClr>
+            </a:lnRef>
+            <a:fillRef idx="1">
+              <a:schemeClr val="accent1"/>
+            </a:fillRef>
+            <a:effectRef idx="0">
+              <a:schemeClr val="accent1"/>
+            </a:effectRef>
+            <a:fontRef idx="minor">
+              <a:schemeClr val="lt1"/>
+            </a:fontRef>
+          </p:style>
+          <p:txBody>
+            <a:bodyPr rtlCol="0" anchor="ctr"/>
+            <a:lstStyle/>
+            <a:p>
+              <a:pPr algn="ctr"/>
+              <a:endParaRPr lang="en-US"/>
+            </a:p>
+          </p:txBody>
+        </p:sp>
+      </p:grpSp>
+      <p:grpSp>
+        <p:nvGrpSpPr>
+          <p:cNvPr id="145" name="Group 144">
+            <a:extLst>
+              <a:ext uri="{FF2B5EF4-FFF2-40B4-BE49-F238E27FC236}">
+                <a16:creationId xmlns:a16="http://schemas.microsoft.com/office/drawing/2014/main" id="{0B0DED89-3473-431A-8AA5-7488E1EBFEAA}"/>
+              </a:ext>
+            </a:extLst>
+          </p:cNvPr>
+          <p:cNvGrpSpPr/>
+          <p:nvPr/>
+        </p:nvGrpSpPr>
+        <p:grpSpPr>
+          <a:xfrm>
+            <a:off x="3440352" y="4375572"/>
+            <a:ext cx="540000" cy="210827"/>
+            <a:chOff x="5825034" y="3354113"/>
+            <a:chExt cx="540000" cy="210827"/>
+          </a:xfrm>
+        </p:grpSpPr>
+        <p:grpSp>
+          <p:nvGrpSpPr>
+            <p:cNvPr id="146" name="Group 208">
+              <a:extLst>
+                <a:ext uri="{FF2B5EF4-FFF2-40B4-BE49-F238E27FC236}">
+                  <a16:creationId xmlns:a16="http://schemas.microsoft.com/office/drawing/2014/main" id="{668AE4D1-1CEA-40A5-9BAD-D4FE043C1C26}"/>
+                </a:ext>
+              </a:extLst>
+            </p:cNvPr>
+            <p:cNvGrpSpPr>
+              <a:grpSpLocks noChangeAspect="1"/>
+            </p:cNvGrpSpPr>
+            <p:nvPr/>
+          </p:nvGrpSpPr>
+          <p:grpSpPr bwMode="auto">
+            <a:xfrm>
+              <a:off x="5825034" y="3383065"/>
+              <a:ext cx="540000" cy="181875"/>
+              <a:chOff x="304800" y="1676931"/>
+              <a:chExt cx="457200" cy="153457"/>
+            </a:xfrm>
+          </p:grpSpPr>
+          <p:cxnSp>
+            <p:nvCxnSpPr>
+              <p:cNvPr id="148" name="Straight Connector 147">
+                <a:extLst>
+                  <a:ext uri="{FF2B5EF4-FFF2-40B4-BE49-F238E27FC236}">
+                    <a16:creationId xmlns:a16="http://schemas.microsoft.com/office/drawing/2014/main" id="{63D792AF-8AFF-4137-8216-C7D568E9FCE2}"/>
+                  </a:ext>
+                </a:extLst>
+              </p:cNvPr>
+              <p:cNvCxnSpPr/>
+              <p:nvPr/>
+            </p:nvCxnSpPr>
+            <p:spPr>
+              <a:xfrm>
+                <a:off x="304800" y="1676931"/>
+                <a:ext cx="457200" cy="1582"/>
+              </a:xfrm>
+              <a:prstGeom prst="line">
+                <a:avLst/>
+              </a:prstGeom>
+              <a:ln w="19050">
+                <a:solidFill>
+                  <a:schemeClr val="tx1"/>
+                </a:solidFill>
+              </a:ln>
+            </p:spPr>
+            <p:style>
+              <a:lnRef idx="1">
+                <a:schemeClr val="accent1"/>
+              </a:lnRef>
+              <a:fillRef idx="0">
+                <a:schemeClr val="accent1"/>
+              </a:fillRef>
+              <a:effectRef idx="0">
+                <a:schemeClr val="accent1"/>
+              </a:effectRef>
+              <a:fontRef idx="minor">
+                <a:schemeClr val="tx1"/>
+              </a:fontRef>
+            </p:style>
+          </p:cxnSp>
+          <p:cxnSp>
+            <p:nvCxnSpPr>
+              <p:cNvPr id="149" name="Straight Connector 148">
+                <a:extLst>
+                  <a:ext uri="{FF2B5EF4-FFF2-40B4-BE49-F238E27FC236}">
+                    <a16:creationId xmlns:a16="http://schemas.microsoft.com/office/drawing/2014/main" id="{F9C4E4C5-8345-45D6-A964-C1B8F5347DF1}"/>
+                  </a:ext>
+                </a:extLst>
+              </p:cNvPr>
+              <p:cNvCxnSpPr/>
+              <p:nvPr/>
+            </p:nvCxnSpPr>
+            <p:spPr>
+              <a:xfrm>
+                <a:off x="457200" y="1828806"/>
+                <a:ext cx="153988" cy="1582"/>
+              </a:xfrm>
+              <a:prstGeom prst="line">
+                <a:avLst/>
+              </a:prstGeom>
+              <a:ln w="19050">
+                <a:solidFill>
+                  <a:schemeClr val="tx1"/>
+                </a:solidFill>
+              </a:ln>
+            </p:spPr>
+            <p:style>
+              <a:lnRef idx="1">
+                <a:schemeClr val="accent1"/>
+              </a:lnRef>
+              <a:fillRef idx="0">
+                <a:schemeClr val="accent1"/>
+              </a:fillRef>
+              <a:effectRef idx="0">
+                <a:schemeClr val="accent1"/>
+              </a:effectRef>
+              <a:fontRef idx="minor">
+                <a:schemeClr val="tx1"/>
+              </a:fontRef>
+            </p:style>
+          </p:cxnSp>
+          <p:cxnSp>
+            <p:nvCxnSpPr>
+              <p:cNvPr id="150" name="Straight Connector 149">
+                <a:extLst>
+                  <a:ext uri="{FF2B5EF4-FFF2-40B4-BE49-F238E27FC236}">
+                    <a16:creationId xmlns:a16="http://schemas.microsoft.com/office/drawing/2014/main" id="{DBBE5FCF-6252-4C7E-B4F4-A1EEF58EF9DC}"/>
+                  </a:ext>
+                </a:extLst>
+              </p:cNvPr>
+              <p:cNvCxnSpPr/>
+              <p:nvPr/>
+            </p:nvCxnSpPr>
+            <p:spPr>
+              <a:xfrm>
+                <a:off x="381000" y="1752869"/>
+                <a:ext cx="304800" cy="1582"/>
+              </a:xfrm>
+              <a:prstGeom prst="line">
+                <a:avLst/>
+              </a:prstGeom>
+              <a:ln w="19050">
+                <a:solidFill>
+                  <a:schemeClr val="tx1"/>
+                </a:solidFill>
+              </a:ln>
+            </p:spPr>
+            <p:style>
+              <a:lnRef idx="1">
+                <a:schemeClr val="accent1"/>
+              </a:lnRef>
+              <a:fillRef idx="0">
+                <a:schemeClr val="accent1"/>
+              </a:fillRef>
+              <a:effectRef idx="0">
+                <a:schemeClr val="accent1"/>
+              </a:effectRef>
+              <a:fontRef idx="minor">
+                <a:schemeClr val="tx1"/>
+              </a:fontRef>
+            </p:style>
+          </p:cxnSp>
+        </p:grpSp>
+        <p:sp>
+          <p:nvSpPr>
+            <p:cNvPr id="147" name="Oval 146">
+              <a:extLst>
+                <a:ext uri="{FF2B5EF4-FFF2-40B4-BE49-F238E27FC236}">
+                  <a16:creationId xmlns:a16="http://schemas.microsoft.com/office/drawing/2014/main" id="{6721265A-076E-42B8-B7AA-04B432F33C7C}"/>
+                </a:ext>
+              </a:extLst>
+            </p:cNvPr>
+            <p:cNvSpPr/>
+            <p:nvPr/>
+          </p:nvSpPr>
+          <p:spPr>
+            <a:xfrm>
+              <a:off x="6073140" y="3354113"/>
+              <a:ext cx="45719" cy="45719"/>
+            </a:xfrm>
+            <a:prstGeom prst="ellipse">
+              <a:avLst/>
+            </a:prstGeom>
+            <a:solidFill>
+              <a:schemeClr val="tx1"/>
+            </a:solidFill>
+            <a:ln>
+              <a:noFill/>
+            </a:ln>
+          </p:spPr>
+          <p:style>
+            <a:lnRef idx="2">
+              <a:schemeClr val="accent1">
+                <a:shade val="50000"/>
+              </a:schemeClr>
+            </a:lnRef>
+            <a:fillRef idx="1">
+              <a:schemeClr val="accent1"/>
+            </a:fillRef>
+            <a:effectRef idx="0">
+              <a:schemeClr val="accent1"/>
+            </a:effectRef>
+            <a:fontRef idx="minor">
+              <a:schemeClr val="lt1"/>
+            </a:fontRef>
+          </p:style>
+          <p:txBody>
+            <a:bodyPr rtlCol="0" anchor="ctr"/>
+            <a:lstStyle/>
+            <a:p>
+              <a:pPr algn="ctr"/>
+              <a:endParaRPr lang="en-US"/>
+            </a:p>
+          </p:txBody>
+        </p:sp>
+      </p:grpSp>
+      <p:cxnSp>
+        <p:nvCxnSpPr>
+          <p:cNvPr id="175" name="Straight Connector 174">
+            <a:extLst>
+              <a:ext uri="{FF2B5EF4-FFF2-40B4-BE49-F238E27FC236}">
+                <a16:creationId xmlns:a16="http://schemas.microsoft.com/office/drawing/2014/main" id="{DA3A9EB9-C318-46A0-822B-D2AF5EA49C2B}"/>
+              </a:ext>
+            </a:extLst>
+          </p:cNvPr>
+          <p:cNvCxnSpPr>
+            <a:cxnSpLocks/>
+            <a:endCxn id="142" idx="0"/>
+          </p:cNvCxnSpPr>
+          <p:nvPr/>
+        </p:nvCxnSpPr>
+        <p:spPr>
+          <a:xfrm flipH="1">
+            <a:off x="3718308" y="3463764"/>
+            <a:ext cx="7599" cy="345822"/>
+          </a:xfrm>
+          <a:prstGeom prst="line">
+            <a:avLst/>
+          </a:prstGeom>
+          <a:ln w="19050" cap="flat">
+            <a:solidFill>
+              <a:schemeClr val="tx1"/>
+            </a:solidFill>
+            <a:headEnd type="oval"/>
+          </a:ln>
+        </p:spPr>
+        <p:style>
+          <a:lnRef idx="1">
+            <a:schemeClr val="accent1"/>
+          </a:lnRef>
+          <a:fillRef idx="0">
+            <a:schemeClr val="accent1"/>
+          </a:fillRef>
+          <a:effectRef idx="0">
+            <a:schemeClr val="accent1"/>
+          </a:effectRef>
+          <a:fontRef idx="minor">
+            <a:schemeClr val="tx1"/>
+          </a:fontRef>
+        </p:style>
+      </p:cxnSp>
+      <p:cxnSp>
+        <p:nvCxnSpPr>
+          <p:cNvPr id="208" name="Straight Connector 207">
+            <a:extLst>
+              <a:ext uri="{FF2B5EF4-FFF2-40B4-BE49-F238E27FC236}">
+                <a16:creationId xmlns:a16="http://schemas.microsoft.com/office/drawing/2014/main" id="{385C3EB9-6D3E-43F1-8423-2AF0EAAF7729}"/>
+              </a:ext>
+            </a:extLst>
+          </p:cNvPr>
+          <p:cNvCxnSpPr>
+            <a:cxnSpLocks/>
+            <a:endCxn id="211" idx="1"/>
+          </p:cNvCxnSpPr>
+          <p:nvPr/>
+        </p:nvCxnSpPr>
+        <p:spPr>
+          <a:xfrm flipV="1">
+            <a:off x="1994428" y="3455872"/>
+            <a:ext cx="617739" cy="1442"/>
+          </a:xfrm>
+          <a:prstGeom prst="line">
+            <a:avLst/>
+          </a:prstGeom>
+          <a:ln w="19050" cap="flat">
+            <a:solidFill>
+              <a:schemeClr val="tx1"/>
+            </a:solidFill>
+            <a:headEnd type="oval"/>
+          </a:ln>
+        </p:spPr>
+        <p:style>
+          <a:lnRef idx="1">
+            <a:schemeClr val="accent1"/>
+          </a:lnRef>
+          <a:fillRef idx="0">
+            <a:schemeClr val="accent1"/>
+          </a:fillRef>
+          <a:effectRef idx="0">
+            <a:schemeClr val="accent1"/>
+          </a:effectRef>
+          <a:fontRef idx="minor">
+            <a:schemeClr val="tx1"/>
+          </a:fontRef>
+        </p:style>
+      </p:cxnSp>
+      <p:cxnSp>
+        <p:nvCxnSpPr>
+          <p:cNvPr id="209" name="Straight Connector 208">
+            <a:extLst>
+              <a:ext uri="{FF2B5EF4-FFF2-40B4-BE49-F238E27FC236}">
+                <a16:creationId xmlns:a16="http://schemas.microsoft.com/office/drawing/2014/main" id="{688E2816-13B4-4D0B-B4C0-A327AC666F04}"/>
+              </a:ext>
+            </a:extLst>
+          </p:cNvPr>
+          <p:cNvCxnSpPr>
+            <a:cxnSpLocks/>
+            <a:stCxn id="214" idx="1"/>
+            <a:endCxn id="211" idx="3"/>
+          </p:cNvCxnSpPr>
+          <p:nvPr/>
+        </p:nvCxnSpPr>
+        <p:spPr>
+          <a:xfrm flipH="1">
+            <a:off x="3152167" y="3454482"/>
+            <a:ext cx="1867306" cy="1390"/>
+          </a:xfrm>
+          <a:prstGeom prst="line">
+            <a:avLst/>
+          </a:prstGeom>
+          <a:ln w="19050" cap="flat">
+            <a:solidFill>
+              <a:schemeClr val="tx1"/>
+            </a:solidFill>
+            <a:headEnd type="none"/>
+          </a:ln>
+        </p:spPr>
+        <p:style>
+          <a:lnRef idx="1">
+            <a:schemeClr val="accent1"/>
+          </a:lnRef>
+          <a:fillRef idx="0">
+            <a:schemeClr val="accent1"/>
+          </a:fillRef>
+          <a:effectRef idx="0">
+            <a:schemeClr val="accent1"/>
+          </a:effectRef>
+          <a:fontRef idx="minor">
+            <a:schemeClr val="tx1"/>
+          </a:fontRef>
+        </p:style>
+      </p:cxnSp>
+      <p:cxnSp>
+        <p:nvCxnSpPr>
+          <p:cNvPr id="210" name="Straight Connector 209">
+            <a:extLst>
+              <a:ext uri="{FF2B5EF4-FFF2-40B4-BE49-F238E27FC236}">
+                <a16:creationId xmlns:a16="http://schemas.microsoft.com/office/drawing/2014/main" id="{4724BA09-1606-4BDE-A678-91B32BA39D6D}"/>
+              </a:ext>
+            </a:extLst>
+          </p:cNvPr>
+          <p:cNvCxnSpPr>
+            <a:cxnSpLocks/>
+            <a:endCxn id="214" idx="3"/>
+          </p:cNvCxnSpPr>
+          <p:nvPr/>
+        </p:nvCxnSpPr>
+        <p:spPr>
+          <a:xfrm flipH="1">
+            <a:off x="5559473" y="3454482"/>
+            <a:ext cx="553065" cy="0"/>
+          </a:xfrm>
+          <a:prstGeom prst="line">
+            <a:avLst/>
+          </a:prstGeom>
+          <a:ln w="19050" cap="flat">
+            <a:solidFill>
+              <a:schemeClr val="tx1"/>
+            </a:solidFill>
+            <a:headEnd type="none"/>
+          </a:ln>
+        </p:spPr>
+        <p:style>
+          <a:lnRef idx="1">
+            <a:schemeClr val="accent1"/>
+          </a:lnRef>
+          <a:fillRef idx="0">
+            <a:schemeClr val="accent1"/>
+          </a:fillRef>
+          <a:effectRef idx="0">
+            <a:schemeClr val="accent1"/>
+          </a:effectRef>
+          <a:fontRef idx="minor">
+            <a:schemeClr val="tx1"/>
+          </a:fontRef>
+        </p:style>
+      </p:cxnSp>
+      <p:sp>
+        <p:nvSpPr>
+          <p:cNvPr id="211" name="Rectangle 210">
+            <a:extLst>
+              <a:ext uri="{FF2B5EF4-FFF2-40B4-BE49-F238E27FC236}">
+                <a16:creationId xmlns:a16="http://schemas.microsoft.com/office/drawing/2014/main" id="{F27CFE1D-B33F-48FF-824A-17F8C7F2DB63}"/>
+              </a:ext>
+            </a:extLst>
+          </p:cNvPr>
+          <p:cNvSpPr/>
+          <p:nvPr/>
+        </p:nvSpPr>
+        <p:spPr>
+          <a:xfrm>
+            <a:off x="2612167" y="3365872"/>
+            <a:ext cx="540000" cy="180000"/>
+          </a:xfrm>
+          <a:prstGeom prst="rect">
+            <a:avLst/>
+          </a:prstGeom>
+          <a:noFill/>
+          <a:ln w="19050">
+            <a:solidFill>
+              <a:schemeClr val="tx1"/>
+            </a:solidFill>
+          </a:ln>
+        </p:spPr>
+        <p:style>
+          <a:lnRef idx="2">
+            <a:schemeClr val="accent1">
+              <a:shade val="50000"/>
+            </a:schemeClr>
+          </a:lnRef>
+          <a:fillRef idx="1">
+            <a:schemeClr val="accent1"/>
+          </a:fillRef>
+          <a:effectRef idx="0">
+            <a:schemeClr val="accent1"/>
+          </a:effectRef>
+          <a:fontRef idx="minor">
+            <a:schemeClr val="lt1"/>
+          </a:fontRef>
+        </p:style>
+        <p:txBody>
+          <a:bodyPr rtlCol="0" anchor="ctr"/>
+          <a:lstStyle/>
+          <a:p>
+            <a:pPr algn="ctr"/>
+            <a:endParaRPr lang="en-US"/>
+          </a:p>
+        </p:txBody>
+      </p:sp>
+      <p:sp>
+        <p:nvSpPr>
+          <p:cNvPr id="214" name="Rectangle 213">
+            <a:extLst>
+              <a:ext uri="{FF2B5EF4-FFF2-40B4-BE49-F238E27FC236}">
+                <a16:creationId xmlns:a16="http://schemas.microsoft.com/office/drawing/2014/main" id="{B6DB79C9-7169-4015-B063-7EC684EDC7AF}"/>
+              </a:ext>
+            </a:extLst>
+          </p:cNvPr>
+          <p:cNvSpPr/>
+          <p:nvPr/>
+        </p:nvSpPr>
+        <p:spPr>
+          <a:xfrm>
+            <a:off x="5019473" y="3364482"/>
+            <a:ext cx="540000" cy="180000"/>
+          </a:xfrm>
+          <a:prstGeom prst="rect">
+            <a:avLst/>
+          </a:prstGeom>
+          <a:noFill/>
+          <a:ln w="19050">
+            <a:solidFill>
+              <a:schemeClr val="tx1"/>
+            </a:solidFill>
+          </a:ln>
+        </p:spPr>
+        <p:style>
+          <a:lnRef idx="2">
+            <a:schemeClr val="accent1">
+              <a:shade val="50000"/>
+            </a:schemeClr>
+          </a:lnRef>
+          <a:fillRef idx="1">
+            <a:schemeClr val="accent1"/>
+          </a:fillRef>
+          <a:effectRef idx="0">
+            <a:schemeClr val="accent1"/>
+          </a:effectRef>
+          <a:fontRef idx="minor">
+            <a:schemeClr val="lt1"/>
+          </a:fontRef>
+        </p:style>
+        <p:txBody>
+          <a:bodyPr rtlCol="0" anchor="ctr"/>
+          <a:lstStyle/>
+          <a:p>
+            <a:pPr algn="ctr"/>
+            <a:endParaRPr lang="en-US"/>
+          </a:p>
+        </p:txBody>
+      </p:sp>
+      <p:cxnSp>
+        <p:nvCxnSpPr>
+          <p:cNvPr id="230" name="Connector: Elbow 229">
+            <a:extLst>
+              <a:ext uri="{FF2B5EF4-FFF2-40B4-BE49-F238E27FC236}">
+                <a16:creationId xmlns:a16="http://schemas.microsoft.com/office/drawing/2014/main" id="{9515E03F-2B63-4F12-9093-09F765DE0ECD}"/>
+              </a:ext>
+            </a:extLst>
+          </p:cNvPr>
+          <p:cNvCxnSpPr>
+            <a:cxnSpLocks/>
+            <a:endCxn id="129" idx="3"/>
+          </p:cNvCxnSpPr>
+          <p:nvPr/>
+        </p:nvCxnSpPr>
+        <p:spPr>
+          <a:xfrm rot="10800000" flipV="1">
+            <a:off x="3736010" y="1404202"/>
+            <a:ext cx="1354601" cy="538226"/>
+          </a:xfrm>
+          <a:prstGeom prst="bentConnector2">
+            <a:avLst/>
+          </a:prstGeom>
+          <a:ln w="19050">
+            <a:solidFill>
+              <a:schemeClr val="tx1"/>
+            </a:solidFill>
+          </a:ln>
+        </p:spPr>
+        <p:style>
+          <a:lnRef idx="1">
+            <a:schemeClr val="accent1"/>
+          </a:lnRef>
+          <a:fillRef idx="0">
+            <a:schemeClr val="accent1"/>
+          </a:fillRef>
+          <a:effectRef idx="0">
+            <a:schemeClr val="accent1"/>
+          </a:effectRef>
+          <a:fontRef idx="minor">
+            <a:schemeClr val="tx1"/>
+          </a:fontRef>
+        </p:style>
+      </p:cxnSp>
+      <p:sp>
+        <p:nvSpPr>
+          <p:cNvPr id="239" name="TextBox 238">
+            <a:extLst>
+              <a:ext uri="{FF2B5EF4-FFF2-40B4-BE49-F238E27FC236}">
+                <a16:creationId xmlns:a16="http://schemas.microsoft.com/office/drawing/2014/main" id="{E35991A2-B52F-404F-9422-CDF575D709A5}"/>
+              </a:ext>
+            </a:extLst>
+          </p:cNvPr>
+          <p:cNvSpPr txBox="1"/>
+          <p:nvPr/>
+        </p:nvSpPr>
+        <p:spPr>
+          <a:xfrm>
+            <a:off x="1004792" y="3130903"/>
+            <a:ext cx="905179" cy="523220"/>
+          </a:xfrm>
+          <a:prstGeom prst="rect">
+            <a:avLst/>
+          </a:prstGeom>
+          <a:noFill/>
+        </p:spPr>
+        <p:txBody>
+          <a:bodyPr wrap="square" rtlCol="0">
+            <a:spAutoFit/>
+          </a:bodyPr>
+          <a:lstStyle/>
+          <a:p>
+            <a:r>
+              <a:rPr lang="en-US" sz="2800" dirty="0" err="1"/>
+              <a:t>T</a:t>
+            </a:r>
+            <a:r>
+              <a:rPr lang="en-US" sz="2800" baseline="-25000" dirty="0" err="1"/>
+              <a:t>amb</a:t>
+            </a:r>
+            <a:r>
+              <a:rPr lang="en-US" sz="2800" baseline="-25000" dirty="0"/>
+              <a:t>   </a:t>
+            </a:r>
+          </a:p>
+        </p:txBody>
+      </p:sp>
+      <p:sp>
+        <p:nvSpPr>
+          <p:cNvPr id="247" name="TextBox 246">
+            <a:extLst>
+              <a:ext uri="{FF2B5EF4-FFF2-40B4-BE49-F238E27FC236}">
+                <a16:creationId xmlns:a16="http://schemas.microsoft.com/office/drawing/2014/main" id="{C02532CC-4EAC-4BA9-9F8C-DD63CCC9296B}"/>
+              </a:ext>
+            </a:extLst>
+          </p:cNvPr>
+          <p:cNvSpPr txBox="1"/>
+          <p:nvPr/>
+        </p:nvSpPr>
+        <p:spPr>
+          <a:xfrm>
+            <a:off x="2290441" y="2768548"/>
+            <a:ext cx="1047082" cy="523220"/>
+          </a:xfrm>
+          <a:prstGeom prst="rect">
+            <a:avLst/>
+          </a:prstGeom>
+          <a:noFill/>
+        </p:spPr>
+        <p:txBody>
+          <a:bodyPr wrap="none" rtlCol="0">
+            <a:spAutoFit/>
+          </a:bodyPr>
+          <a:lstStyle/>
+          <a:p>
+            <a:r>
+              <a:rPr lang="en-US" sz="2800" dirty="0"/>
+              <a:t>R</a:t>
+            </a:r>
+            <a:r>
+              <a:rPr lang="en-US" sz="2800" baseline="-25000" dirty="0"/>
+              <a:t>0, </a:t>
+            </a:r>
+            <a:r>
+              <a:rPr lang="en-US" sz="2800" baseline="-25000" dirty="0" err="1"/>
+              <a:t>amb</a:t>
+            </a:r>
+            <a:endParaRPr lang="en-US" sz="2800" baseline="-25000" dirty="0"/>
+          </a:p>
+        </p:txBody>
+      </p:sp>
+      <p:sp>
+        <p:nvSpPr>
+          <p:cNvPr id="248" name="TextBox 247">
+            <a:extLst>
+              <a:ext uri="{FF2B5EF4-FFF2-40B4-BE49-F238E27FC236}">
+                <a16:creationId xmlns:a16="http://schemas.microsoft.com/office/drawing/2014/main" id="{37C15B80-2A88-44CF-B44E-D527D9B31F5F}"/>
+              </a:ext>
+            </a:extLst>
+          </p:cNvPr>
+          <p:cNvSpPr txBox="1"/>
+          <p:nvPr/>
+        </p:nvSpPr>
+        <p:spPr>
+          <a:xfrm>
+            <a:off x="4963374" y="2763845"/>
+            <a:ext cx="623889" cy="523220"/>
+          </a:xfrm>
+          <a:prstGeom prst="rect">
+            <a:avLst/>
+          </a:prstGeom>
+          <a:noFill/>
+        </p:spPr>
+        <p:txBody>
+          <a:bodyPr wrap="none" rtlCol="0">
+            <a:spAutoFit/>
+          </a:bodyPr>
+          <a:lstStyle/>
+          <a:p>
+            <a:r>
+              <a:rPr lang="en-US" sz="2800" dirty="0"/>
+              <a:t>R</a:t>
+            </a:r>
+            <a:r>
+              <a:rPr lang="en-US" sz="2800" baseline="-25000" dirty="0"/>
+              <a:t>01</a:t>
+            </a:r>
+          </a:p>
+        </p:txBody>
+      </p:sp>
+      <p:sp>
+        <p:nvSpPr>
+          <p:cNvPr id="78" name="TextBox 77">
+            <a:extLst>
+              <a:ext uri="{FF2B5EF4-FFF2-40B4-BE49-F238E27FC236}">
+                <a16:creationId xmlns:a16="http://schemas.microsoft.com/office/drawing/2014/main" id="{C4A0BE18-165C-4015-B6A1-8B1964C93765}"/>
+              </a:ext>
+            </a:extLst>
+          </p:cNvPr>
+          <p:cNvSpPr txBox="1"/>
+          <p:nvPr/>
+        </p:nvSpPr>
+        <p:spPr>
+          <a:xfrm>
+            <a:off x="7649110" y="1838241"/>
+            <a:ext cx="1775038" cy="1815882"/>
+          </a:xfrm>
+          <a:prstGeom prst="rect">
+            <a:avLst/>
+          </a:prstGeom>
+          <a:noFill/>
+        </p:spPr>
+        <p:txBody>
+          <a:bodyPr wrap="none" rtlCol="0">
+            <a:spAutoFit/>
+          </a:bodyPr>
+          <a:lstStyle/>
+          <a:p>
+            <a:r>
+              <a:rPr lang="en-US" sz="2800" dirty="0"/>
+              <a:t>C</a:t>
+            </a:r>
+            <a:r>
+              <a:rPr lang="en-US" sz="2800" baseline="-25000" dirty="0"/>
+              <a:t>0: </a:t>
+            </a:r>
+            <a:r>
+              <a:rPr lang="en-US" sz="2800" dirty="0"/>
+              <a:t>air</a:t>
+            </a:r>
+          </a:p>
+          <a:p>
+            <a:r>
+              <a:rPr lang="en-US" sz="2800" dirty="0"/>
+              <a:t>C</a:t>
+            </a:r>
+            <a:r>
+              <a:rPr lang="en-US" sz="2800" baseline="-25000" dirty="0"/>
+              <a:t>1: </a:t>
+            </a:r>
+            <a:r>
+              <a:rPr lang="en-US" sz="2800" dirty="0"/>
+              <a:t>wall</a:t>
+            </a:r>
+          </a:p>
+          <a:p>
+            <a:r>
+              <a:rPr lang="en-US" sz="2800" dirty="0"/>
+              <a:t>C</a:t>
+            </a:r>
+            <a:r>
+              <a:rPr lang="en-US" sz="2800" baseline="-25000" dirty="0"/>
+              <a:t>2: </a:t>
+            </a:r>
+            <a:r>
+              <a:rPr lang="en-US" sz="2800" dirty="0"/>
+              <a:t>radiator</a:t>
+            </a:r>
+          </a:p>
+          <a:p>
+            <a:endParaRPr lang="en-US" sz="2800" dirty="0"/>
+          </a:p>
+        </p:txBody>
+      </p:sp>
+      <p:sp>
+        <p:nvSpPr>
+          <p:cNvPr id="96" name="TextBox 95">
+            <a:extLst>
+              <a:ext uri="{FF2B5EF4-FFF2-40B4-BE49-F238E27FC236}">
+                <a16:creationId xmlns:a16="http://schemas.microsoft.com/office/drawing/2014/main" id="{8EFA9C7A-8B1B-4036-8E1E-5CBC023A5CA2}"/>
+              </a:ext>
+            </a:extLst>
+          </p:cNvPr>
+          <p:cNvSpPr txBox="1"/>
+          <p:nvPr/>
+        </p:nvSpPr>
+        <p:spPr>
+          <a:xfrm>
+            <a:off x="4395622" y="1661704"/>
+            <a:ext cx="660758" cy="523220"/>
+          </a:xfrm>
+          <a:prstGeom prst="rect">
+            <a:avLst/>
+          </a:prstGeom>
+          <a:noFill/>
+        </p:spPr>
+        <p:txBody>
+          <a:bodyPr wrap="none" rtlCol="0">
+            <a:spAutoFit/>
+          </a:bodyPr>
+          <a:lstStyle/>
+          <a:p>
+            <a:r>
+              <a:rPr lang="en-US" sz="2800" dirty="0"/>
+              <a:t>C</a:t>
+            </a:r>
+            <a:r>
+              <a:rPr lang="en-US" sz="2800" baseline="-25000" dirty="0"/>
+              <a:t>2   </a:t>
+            </a:r>
+          </a:p>
+        </p:txBody>
+      </p:sp>
+      <p:cxnSp>
+        <p:nvCxnSpPr>
+          <p:cNvPr id="97" name="Straight Connector 96">
+            <a:extLst>
+              <a:ext uri="{FF2B5EF4-FFF2-40B4-BE49-F238E27FC236}">
+                <a16:creationId xmlns:a16="http://schemas.microsoft.com/office/drawing/2014/main" id="{A17E3835-9A9B-4752-8A76-2F30FD0616DE}"/>
+              </a:ext>
+            </a:extLst>
+          </p:cNvPr>
+          <p:cNvCxnSpPr>
+            <a:cxnSpLocks/>
+            <a:stCxn id="104" idx="0"/>
+            <a:endCxn id="99" idx="2"/>
+          </p:cNvCxnSpPr>
+          <p:nvPr/>
+        </p:nvCxnSpPr>
+        <p:spPr>
+          <a:xfrm flipV="1">
+            <a:off x="5076630" y="1843029"/>
+            <a:ext cx="6990" cy="577578"/>
+          </a:xfrm>
+          <a:prstGeom prst="line">
+            <a:avLst/>
+          </a:prstGeom>
+          <a:ln w="19050" cap="flat">
+            <a:solidFill>
+              <a:schemeClr val="tx1"/>
+            </a:solidFill>
+            <a:headEnd type="none"/>
+          </a:ln>
+        </p:spPr>
+        <p:style>
+          <a:lnRef idx="1">
+            <a:schemeClr val="accent1"/>
+          </a:lnRef>
+          <a:fillRef idx="0">
+            <a:schemeClr val="accent1"/>
+          </a:fillRef>
+          <a:effectRef idx="0">
+            <a:schemeClr val="accent1"/>
+          </a:effectRef>
+          <a:fontRef idx="minor">
+            <a:schemeClr val="tx1"/>
+          </a:fontRef>
+        </p:style>
+      </p:cxnSp>
+      <p:grpSp>
+        <p:nvGrpSpPr>
+          <p:cNvPr id="98" name="Group 97">
+            <a:extLst>
+              <a:ext uri="{FF2B5EF4-FFF2-40B4-BE49-F238E27FC236}">
+                <a16:creationId xmlns:a16="http://schemas.microsoft.com/office/drawing/2014/main" id="{9F36720F-C629-4D9B-88A3-3FB9A0F6AC20}"/>
+              </a:ext>
+            </a:extLst>
+          </p:cNvPr>
+          <p:cNvGrpSpPr/>
+          <p:nvPr/>
+        </p:nvGrpSpPr>
+        <p:grpSpPr>
+          <a:xfrm>
+            <a:off x="4794670" y="1645029"/>
+            <a:ext cx="587606" cy="216000"/>
+            <a:chOff x="6300555" y="1303873"/>
+            <a:chExt cx="587606" cy="216000"/>
+          </a:xfrm>
+        </p:grpSpPr>
+        <p:sp>
+          <p:nvSpPr>
+            <p:cNvPr id="99" name="Rectangle 98">
+              <a:extLst>
+                <a:ext uri="{FF2B5EF4-FFF2-40B4-BE49-F238E27FC236}">
+                  <a16:creationId xmlns:a16="http://schemas.microsoft.com/office/drawing/2014/main" id="{DEE948A5-F712-4786-8714-5333DF889D2D}"/>
+                </a:ext>
+              </a:extLst>
+            </p:cNvPr>
+            <p:cNvSpPr/>
+            <p:nvPr/>
+          </p:nvSpPr>
+          <p:spPr>
+            <a:xfrm>
+              <a:off x="6319505" y="1321873"/>
+              <a:ext cx="540000" cy="180000"/>
+            </a:xfrm>
+            <a:prstGeom prst="rect">
+              <a:avLst/>
+            </a:prstGeom>
+            <a:noFill/>
+            <a:ln w="19050">
+              <a:solidFill>
+                <a:schemeClr val="tx1"/>
+              </a:solidFill>
+            </a:ln>
+          </p:spPr>
+          <p:style>
+            <a:lnRef idx="2">
+              <a:schemeClr val="accent1">
+                <a:shade val="50000"/>
+              </a:schemeClr>
+            </a:lnRef>
+            <a:fillRef idx="1">
+              <a:schemeClr val="accent1"/>
+            </a:fillRef>
+            <a:effectRef idx="0">
+              <a:schemeClr val="accent1"/>
+            </a:effectRef>
+            <a:fontRef idx="minor">
+              <a:schemeClr val="lt1"/>
+            </a:fontRef>
+          </p:style>
+          <p:txBody>
+            <a:bodyPr rtlCol="0" anchor="ctr"/>
+            <a:lstStyle/>
+            <a:p>
+              <a:pPr algn="ctr"/>
+              <a:endParaRPr lang="en-US"/>
+            </a:p>
+          </p:txBody>
+        </p:sp>
+        <p:sp>
+          <p:nvSpPr>
+            <p:cNvPr id="100" name="Rectangle 99">
+              <a:extLst>
+                <a:ext uri="{FF2B5EF4-FFF2-40B4-BE49-F238E27FC236}">
+                  <a16:creationId xmlns:a16="http://schemas.microsoft.com/office/drawing/2014/main" id="{E04C56C2-B599-4F3A-B8B5-C8509357DB70}"/>
+                </a:ext>
+              </a:extLst>
+            </p:cNvPr>
+            <p:cNvSpPr/>
+            <p:nvPr/>
+          </p:nvSpPr>
+          <p:spPr>
+            <a:xfrm>
+              <a:off x="6300555" y="1303873"/>
+              <a:ext cx="36000" cy="216000"/>
+            </a:xfrm>
+            <a:prstGeom prst="rect">
+              <a:avLst/>
+            </a:prstGeom>
+            <a:solidFill>
+              <a:schemeClr val="bg1"/>
+            </a:solidFill>
+            <a:ln w="19050">
+              <a:noFill/>
+            </a:ln>
+          </p:spPr>
+          <p:style>
+            <a:lnRef idx="2">
+              <a:schemeClr val="accent1">
+                <a:shade val="50000"/>
+              </a:schemeClr>
+            </a:lnRef>
+            <a:fillRef idx="1">
+              <a:schemeClr val="accent1"/>
+            </a:fillRef>
+            <a:effectRef idx="0">
+              <a:schemeClr val="accent1"/>
+            </a:effectRef>
+            <a:fontRef idx="minor">
+              <a:schemeClr val="lt1"/>
+            </a:fontRef>
+          </p:style>
+          <p:txBody>
+            <a:bodyPr rtlCol="0" anchor="ctr"/>
+            <a:lstStyle/>
+            <a:p>
+              <a:pPr algn="ctr"/>
+              <a:endParaRPr lang="en-US"/>
+            </a:p>
+          </p:txBody>
+        </p:sp>
+        <p:sp>
+          <p:nvSpPr>
+            <p:cNvPr id="101" name="Rectangle 100">
+              <a:extLst>
+                <a:ext uri="{FF2B5EF4-FFF2-40B4-BE49-F238E27FC236}">
+                  <a16:creationId xmlns:a16="http://schemas.microsoft.com/office/drawing/2014/main" id="{548423B5-8A7E-4B5E-9A31-0C89AAC9F188}"/>
+                </a:ext>
+              </a:extLst>
+            </p:cNvPr>
+            <p:cNvSpPr/>
+            <p:nvPr/>
+          </p:nvSpPr>
+          <p:spPr>
+            <a:xfrm>
+              <a:off x="6852161" y="1303873"/>
+              <a:ext cx="36000" cy="216000"/>
+            </a:xfrm>
+            <a:prstGeom prst="rect">
+              <a:avLst/>
+            </a:prstGeom>
+            <a:solidFill>
+              <a:schemeClr val="bg1"/>
+            </a:solidFill>
+            <a:ln w="19050">
+              <a:noFill/>
+            </a:ln>
+          </p:spPr>
+          <p:style>
+            <a:lnRef idx="2">
+              <a:schemeClr val="accent1">
+                <a:shade val="50000"/>
+              </a:schemeClr>
+            </a:lnRef>
+            <a:fillRef idx="1">
+              <a:schemeClr val="accent1"/>
+            </a:fillRef>
+            <a:effectRef idx="0">
+              <a:schemeClr val="accent1"/>
+            </a:effectRef>
+            <a:fontRef idx="minor">
+              <a:schemeClr val="lt1"/>
+            </a:fontRef>
+          </p:style>
+          <p:txBody>
+            <a:bodyPr rtlCol="0" anchor="ctr"/>
+            <a:lstStyle/>
+            <a:p>
+              <a:pPr algn="ctr"/>
+              <a:endParaRPr lang="en-US"/>
+            </a:p>
+          </p:txBody>
+        </p:sp>
+      </p:grpSp>
+      <p:grpSp>
+        <p:nvGrpSpPr>
+          <p:cNvPr id="102" name="Group 101">
+            <a:extLst>
+              <a:ext uri="{FF2B5EF4-FFF2-40B4-BE49-F238E27FC236}">
+                <a16:creationId xmlns:a16="http://schemas.microsoft.com/office/drawing/2014/main" id="{F92ED0B1-7CE4-4D5F-BE52-AD5EE8D7210E}"/>
+              </a:ext>
+            </a:extLst>
+          </p:cNvPr>
+          <p:cNvGrpSpPr/>
+          <p:nvPr/>
+        </p:nvGrpSpPr>
+        <p:grpSpPr>
+          <a:xfrm>
+            <a:off x="4805664" y="2420607"/>
+            <a:ext cx="540000" cy="210827"/>
+            <a:chOff x="5825034" y="3354113"/>
+            <a:chExt cx="540000" cy="210827"/>
+          </a:xfrm>
+        </p:grpSpPr>
+        <p:grpSp>
+          <p:nvGrpSpPr>
+            <p:cNvPr id="103" name="Group 208">
+              <a:extLst>
+                <a:ext uri="{FF2B5EF4-FFF2-40B4-BE49-F238E27FC236}">
+                  <a16:creationId xmlns:a16="http://schemas.microsoft.com/office/drawing/2014/main" id="{82FDF9FE-3A07-4CAA-A2E1-39D80C74F309}"/>
+                </a:ext>
+              </a:extLst>
+            </p:cNvPr>
+            <p:cNvGrpSpPr>
+              <a:grpSpLocks noChangeAspect="1"/>
+            </p:cNvGrpSpPr>
+            <p:nvPr/>
+          </p:nvGrpSpPr>
+          <p:grpSpPr bwMode="auto">
+            <a:xfrm>
+              <a:off x="5825034" y="3383065"/>
+              <a:ext cx="540000" cy="181875"/>
+              <a:chOff x="304800" y="1676931"/>
+              <a:chExt cx="457200" cy="153457"/>
+            </a:xfrm>
+          </p:grpSpPr>
+          <p:cxnSp>
+            <p:nvCxnSpPr>
+              <p:cNvPr id="105" name="Straight Connector 104">
+                <a:extLst>
+                  <a:ext uri="{FF2B5EF4-FFF2-40B4-BE49-F238E27FC236}">
+                    <a16:creationId xmlns:a16="http://schemas.microsoft.com/office/drawing/2014/main" id="{46D1A8E5-77EE-4D4A-B657-AEBBE789EA99}"/>
+                  </a:ext>
+                </a:extLst>
+              </p:cNvPr>
+              <p:cNvCxnSpPr/>
+              <p:nvPr/>
+            </p:nvCxnSpPr>
+            <p:spPr>
+              <a:xfrm>
+                <a:off x="304800" y="1676931"/>
+                <a:ext cx="457200" cy="1582"/>
+              </a:xfrm>
+              <a:prstGeom prst="line">
+                <a:avLst/>
+              </a:prstGeom>
+              <a:ln w="19050">
+                <a:solidFill>
+                  <a:schemeClr val="tx1"/>
+                </a:solidFill>
+              </a:ln>
+            </p:spPr>
+            <p:style>
+              <a:lnRef idx="1">
+                <a:schemeClr val="accent1"/>
+              </a:lnRef>
+              <a:fillRef idx="0">
+                <a:schemeClr val="accent1"/>
+              </a:fillRef>
+              <a:effectRef idx="0">
+                <a:schemeClr val="accent1"/>
+              </a:effectRef>
+              <a:fontRef idx="minor">
+                <a:schemeClr val="tx1"/>
+              </a:fontRef>
+            </p:style>
+          </p:cxnSp>
+          <p:cxnSp>
+            <p:nvCxnSpPr>
+              <p:cNvPr id="106" name="Straight Connector 105">
+                <a:extLst>
+                  <a:ext uri="{FF2B5EF4-FFF2-40B4-BE49-F238E27FC236}">
+                    <a16:creationId xmlns:a16="http://schemas.microsoft.com/office/drawing/2014/main" id="{38A12940-6BDE-4F30-A640-958F86475BFB}"/>
+                  </a:ext>
+                </a:extLst>
+              </p:cNvPr>
+              <p:cNvCxnSpPr/>
+              <p:nvPr/>
+            </p:nvCxnSpPr>
+            <p:spPr>
+              <a:xfrm>
+                <a:off x="457200" y="1828806"/>
+                <a:ext cx="153988" cy="1582"/>
+              </a:xfrm>
+              <a:prstGeom prst="line">
+                <a:avLst/>
+              </a:prstGeom>
+              <a:ln w="19050">
+                <a:solidFill>
+                  <a:schemeClr val="tx1"/>
+                </a:solidFill>
+              </a:ln>
+            </p:spPr>
+            <p:style>
+              <a:lnRef idx="1">
+                <a:schemeClr val="accent1"/>
+              </a:lnRef>
+              <a:fillRef idx="0">
+                <a:schemeClr val="accent1"/>
+              </a:fillRef>
+              <a:effectRef idx="0">
+                <a:schemeClr val="accent1"/>
+              </a:effectRef>
+              <a:fontRef idx="minor">
+                <a:schemeClr val="tx1"/>
+              </a:fontRef>
+            </p:style>
+          </p:cxnSp>
+          <p:cxnSp>
+            <p:nvCxnSpPr>
+              <p:cNvPr id="107" name="Straight Connector 106">
+                <a:extLst>
+                  <a:ext uri="{FF2B5EF4-FFF2-40B4-BE49-F238E27FC236}">
+                    <a16:creationId xmlns:a16="http://schemas.microsoft.com/office/drawing/2014/main" id="{09C648BF-22CA-4C35-9536-371370D782C4}"/>
+                  </a:ext>
+                </a:extLst>
+              </p:cNvPr>
+              <p:cNvCxnSpPr/>
+              <p:nvPr/>
+            </p:nvCxnSpPr>
+            <p:spPr>
+              <a:xfrm>
+                <a:off x="381000" y="1752869"/>
+                <a:ext cx="304800" cy="1582"/>
+              </a:xfrm>
+              <a:prstGeom prst="line">
+                <a:avLst/>
+              </a:prstGeom>
+              <a:ln w="19050">
+                <a:solidFill>
+                  <a:schemeClr val="tx1"/>
+                </a:solidFill>
+              </a:ln>
+            </p:spPr>
+            <p:style>
+              <a:lnRef idx="1">
+                <a:schemeClr val="accent1"/>
+              </a:lnRef>
+              <a:fillRef idx="0">
+                <a:schemeClr val="accent1"/>
+              </a:fillRef>
+              <a:effectRef idx="0">
+                <a:schemeClr val="accent1"/>
+              </a:effectRef>
+              <a:fontRef idx="minor">
+                <a:schemeClr val="tx1"/>
+              </a:fontRef>
+            </p:style>
+          </p:cxnSp>
+        </p:grpSp>
+        <p:sp>
+          <p:nvSpPr>
+            <p:cNvPr id="104" name="Oval 103">
+              <a:extLst>
+                <a:ext uri="{FF2B5EF4-FFF2-40B4-BE49-F238E27FC236}">
+                  <a16:creationId xmlns:a16="http://schemas.microsoft.com/office/drawing/2014/main" id="{DDCBA474-E784-4AB3-BDB6-225794652A81}"/>
+                </a:ext>
+              </a:extLst>
+            </p:cNvPr>
+            <p:cNvSpPr/>
+            <p:nvPr/>
+          </p:nvSpPr>
+          <p:spPr>
+            <a:xfrm>
+              <a:off x="6073140" y="3354113"/>
+              <a:ext cx="45719" cy="45719"/>
+            </a:xfrm>
+            <a:prstGeom prst="ellipse">
+              <a:avLst/>
+            </a:prstGeom>
+            <a:solidFill>
+              <a:schemeClr val="tx1"/>
+            </a:solidFill>
+            <a:ln>
+              <a:noFill/>
+            </a:ln>
+          </p:spPr>
+          <p:style>
+            <a:lnRef idx="2">
+              <a:schemeClr val="accent1">
+                <a:shade val="50000"/>
+              </a:schemeClr>
+            </a:lnRef>
+            <a:fillRef idx="1">
+              <a:schemeClr val="accent1"/>
+            </a:fillRef>
+            <a:effectRef idx="0">
+              <a:schemeClr val="accent1"/>
+            </a:effectRef>
+            <a:fontRef idx="minor">
+              <a:schemeClr val="lt1"/>
+            </a:fontRef>
+          </p:style>
+          <p:txBody>
+            <a:bodyPr rtlCol="0" anchor="ctr"/>
+            <a:lstStyle/>
+            <a:p>
+              <a:pPr algn="ctr"/>
+              <a:endParaRPr lang="en-US"/>
+            </a:p>
+          </p:txBody>
+        </p:sp>
+      </p:grpSp>
+      <p:cxnSp>
+        <p:nvCxnSpPr>
+          <p:cNvPr id="125" name="Straight Connector 124">
+            <a:extLst>
+              <a:ext uri="{FF2B5EF4-FFF2-40B4-BE49-F238E27FC236}">
+                <a16:creationId xmlns:a16="http://schemas.microsoft.com/office/drawing/2014/main" id="{4A760031-B7A1-4538-8692-8C9078F2F29D}"/>
+              </a:ext>
+            </a:extLst>
+          </p:cNvPr>
+          <p:cNvCxnSpPr>
+            <a:cxnSpLocks/>
+            <a:endCxn id="99" idx="0"/>
+          </p:cNvCxnSpPr>
+          <p:nvPr/>
+        </p:nvCxnSpPr>
+        <p:spPr>
+          <a:xfrm flipH="1">
+            <a:off x="5083620" y="1414057"/>
+            <a:ext cx="13057" cy="248972"/>
+          </a:xfrm>
+          <a:prstGeom prst="line">
+            <a:avLst/>
+          </a:prstGeom>
+          <a:ln w="19050" cap="flat">
+            <a:solidFill>
+              <a:schemeClr val="tx1"/>
+            </a:solidFill>
+            <a:headEnd type="oval"/>
+          </a:ln>
+        </p:spPr>
+        <p:style>
+          <a:lnRef idx="1">
+            <a:schemeClr val="accent1"/>
+          </a:lnRef>
+          <a:fillRef idx="0">
+            <a:schemeClr val="accent1"/>
+          </a:fillRef>
+          <a:effectRef idx="0">
+            <a:schemeClr val="accent1"/>
+          </a:effectRef>
+          <a:fontRef idx="minor">
+            <a:schemeClr val="tx1"/>
+          </a:fontRef>
+        </p:style>
+      </p:cxnSp>
+      <p:sp>
+        <p:nvSpPr>
+          <p:cNvPr id="129" name="Rectangle 128">
+            <a:extLst>
+              <a:ext uri="{FF2B5EF4-FFF2-40B4-BE49-F238E27FC236}">
+                <a16:creationId xmlns:a16="http://schemas.microsoft.com/office/drawing/2014/main" id="{942FEEB0-D9C4-41E1-989C-B5D9279BE21C}"/>
+              </a:ext>
+            </a:extLst>
+          </p:cNvPr>
+          <p:cNvSpPr/>
+          <p:nvPr/>
+        </p:nvSpPr>
+        <p:spPr>
+          <a:xfrm rot="16200000">
+            <a:off x="3466009" y="2122428"/>
+            <a:ext cx="540000" cy="180000"/>
+          </a:xfrm>
+          <a:prstGeom prst="rect">
+            <a:avLst/>
+          </a:prstGeom>
+          <a:noFill/>
+          <a:ln w="19050">
+            <a:solidFill>
+              <a:schemeClr val="tx1"/>
+            </a:solidFill>
+          </a:ln>
+        </p:spPr>
+        <p:style>
+          <a:lnRef idx="2">
+            <a:schemeClr val="accent1">
+              <a:shade val="50000"/>
+            </a:schemeClr>
+          </a:lnRef>
+          <a:fillRef idx="1">
+            <a:schemeClr val="accent1"/>
+          </a:fillRef>
+          <a:effectRef idx="0">
+            <a:schemeClr val="accent1"/>
+          </a:effectRef>
+          <a:fontRef idx="minor">
+            <a:schemeClr val="lt1"/>
+          </a:fontRef>
+        </p:style>
+        <p:txBody>
+          <a:bodyPr rtlCol="0" anchor="ctr"/>
+          <a:lstStyle/>
+          <a:p>
+            <a:pPr algn="ctr"/>
+            <a:endParaRPr lang="en-US" dirty="0"/>
+          </a:p>
+        </p:txBody>
+      </p:sp>
+      <p:sp>
+        <p:nvSpPr>
+          <p:cNvPr id="131" name="TextBox 130">
+            <a:extLst>
+              <a:ext uri="{FF2B5EF4-FFF2-40B4-BE49-F238E27FC236}">
+                <a16:creationId xmlns:a16="http://schemas.microsoft.com/office/drawing/2014/main" id="{9C7211DF-747A-4854-8989-680F138D1E93}"/>
+              </a:ext>
+            </a:extLst>
+          </p:cNvPr>
+          <p:cNvSpPr txBox="1"/>
+          <p:nvPr/>
+        </p:nvSpPr>
+        <p:spPr>
+          <a:xfrm>
+            <a:off x="2834579" y="1233148"/>
+            <a:ext cx="1867306" cy="1384995"/>
+          </a:xfrm>
+          <a:prstGeom prst="rect">
+            <a:avLst/>
+          </a:prstGeom>
+          <a:noFill/>
+        </p:spPr>
+        <p:txBody>
+          <a:bodyPr wrap="square" rtlCol="0">
+            <a:spAutoFit/>
+          </a:bodyPr>
+          <a:lstStyle/>
+          <a:p>
+            <a:r>
+              <a:rPr lang="en-US" sz="2800" dirty="0"/>
+              <a:t>1/R</a:t>
+            </a:r>
+            <a:r>
+              <a:rPr lang="en-US" sz="2800" baseline="-25000" dirty="0"/>
+              <a:t>02</a:t>
+            </a:r>
+          </a:p>
+          <a:p>
+            <a:r>
+              <a:rPr lang="en-US" sz="2800" dirty="0"/>
+              <a:t>=</a:t>
+            </a:r>
+          </a:p>
+          <a:p>
+            <a:r>
+              <a:rPr lang="en-US" sz="2800" dirty="0"/>
+              <a:t>U*A</a:t>
+            </a:r>
+            <a:endParaRPr lang="en-US" sz="2800" baseline="-25000" dirty="0"/>
+          </a:p>
+        </p:txBody>
+      </p:sp>
+      <p:cxnSp>
+        <p:nvCxnSpPr>
+          <p:cNvPr id="138" name="Straight Connector 137">
+            <a:extLst>
+              <a:ext uri="{FF2B5EF4-FFF2-40B4-BE49-F238E27FC236}">
+                <a16:creationId xmlns:a16="http://schemas.microsoft.com/office/drawing/2014/main" id="{B91CB3A6-B047-4FBA-8A76-831620ED3D4D}"/>
+              </a:ext>
+            </a:extLst>
+          </p:cNvPr>
+          <p:cNvCxnSpPr>
+            <a:cxnSpLocks/>
+          </p:cNvCxnSpPr>
+          <p:nvPr/>
+        </p:nvCxnSpPr>
+        <p:spPr>
+          <a:xfrm flipV="1">
+            <a:off x="3725907" y="2482428"/>
+            <a:ext cx="10102" cy="972054"/>
+          </a:xfrm>
+          <a:prstGeom prst="line">
+            <a:avLst/>
+          </a:prstGeom>
+          <a:ln w="19050" cap="flat">
+            <a:solidFill>
+              <a:schemeClr val="tx1"/>
+            </a:solidFill>
+            <a:headEnd type="none"/>
+          </a:ln>
+        </p:spPr>
+        <p:style>
+          <a:lnRef idx="1">
+            <a:schemeClr val="accent1"/>
+          </a:lnRef>
+          <a:fillRef idx="0">
+            <a:schemeClr val="accent1"/>
+          </a:fillRef>
+          <a:effectRef idx="0">
+            <a:schemeClr val="accent1"/>
+          </a:effectRef>
+          <a:fontRef idx="minor">
+            <a:schemeClr val="tx1"/>
+          </a:fontRef>
+        </p:style>
+      </p:cxnSp>
+      <p:sp>
+        <p:nvSpPr>
+          <p:cNvPr id="180" name="TextBox 179">
+            <a:extLst>
+              <a:ext uri="{FF2B5EF4-FFF2-40B4-BE49-F238E27FC236}">
+                <a16:creationId xmlns:a16="http://schemas.microsoft.com/office/drawing/2014/main" id="{E642D9B5-DD88-4C30-A38F-28F4E9DC30B9}"/>
+              </a:ext>
+            </a:extLst>
+          </p:cNvPr>
+          <p:cNvSpPr txBox="1"/>
+          <p:nvPr/>
+        </p:nvSpPr>
+        <p:spPr>
+          <a:xfrm>
+            <a:off x="6143488" y="1152447"/>
+            <a:ext cx="776687" cy="523220"/>
+          </a:xfrm>
+          <a:prstGeom prst="rect">
+            <a:avLst/>
+          </a:prstGeom>
+          <a:noFill/>
+        </p:spPr>
+        <p:txBody>
+          <a:bodyPr wrap="none" rtlCol="0">
+            <a:spAutoFit/>
+          </a:bodyPr>
+          <a:lstStyle/>
+          <a:p>
+            <a:r>
+              <a:rPr lang="en-US" sz="2800" dirty="0" err="1"/>
+              <a:t>Q</a:t>
+            </a:r>
+            <a:r>
+              <a:rPr lang="en-US" sz="2800" baseline="-25000" dirty="0" err="1"/>
+              <a:t>inst</a:t>
+            </a:r>
+            <a:endParaRPr lang="en-US" sz="2800" baseline="-25000" dirty="0"/>
+          </a:p>
+        </p:txBody>
+      </p:sp>
+      <p:cxnSp>
+        <p:nvCxnSpPr>
+          <p:cNvPr id="79" name="Straight Connector 78">
+            <a:extLst>
+              <a:ext uri="{FF2B5EF4-FFF2-40B4-BE49-F238E27FC236}">
+                <a16:creationId xmlns:a16="http://schemas.microsoft.com/office/drawing/2014/main" id="{A4F44BC2-7E17-475A-8205-8A7A6199DCA4}"/>
+              </a:ext>
+            </a:extLst>
+          </p:cNvPr>
+          <p:cNvCxnSpPr>
+            <a:cxnSpLocks/>
+          </p:cNvCxnSpPr>
+          <p:nvPr/>
+        </p:nvCxnSpPr>
+        <p:spPr>
+          <a:xfrm flipH="1" flipV="1">
+            <a:off x="5099376" y="1405179"/>
+            <a:ext cx="923290" cy="0"/>
+          </a:xfrm>
+          <a:prstGeom prst="line">
+            <a:avLst/>
+          </a:prstGeom>
+          <a:ln w="19050" cap="flat">
+            <a:solidFill>
+              <a:schemeClr val="tx1"/>
+            </a:solidFill>
+            <a:headEnd type="oval"/>
+          </a:ln>
+        </p:spPr>
+        <p:style>
+          <a:lnRef idx="1">
+            <a:schemeClr val="accent1"/>
+          </a:lnRef>
+          <a:fillRef idx="0">
+            <a:schemeClr val="accent1"/>
+          </a:fillRef>
+          <a:effectRef idx="0">
+            <a:schemeClr val="accent1"/>
+          </a:effectRef>
+          <a:fontRef idx="minor">
+            <a:schemeClr val="tx1"/>
+          </a:fontRef>
+        </p:style>
+      </p:cxnSp>
+      <p:pic>
+        <p:nvPicPr>
+          <p:cNvPr id="23" name="Picture 22" descr="Icon&#10;&#10;Description automatically generated">
+            <a:extLst>
+              <a:ext uri="{FF2B5EF4-FFF2-40B4-BE49-F238E27FC236}">
+                <a16:creationId xmlns:a16="http://schemas.microsoft.com/office/drawing/2014/main" id="{E3921903-BE49-44DA-B6C7-6C21C02007F9}"/>
+              </a:ext>
+            </a:extLst>
+          </p:cNvPr>
+          <p:cNvPicPr>
+            <a:picLocks noChangeAspect="1"/>
+          </p:cNvPicPr>
+          <p:nvPr/>
+        </p:nvPicPr>
+        <p:blipFill>
+          <a:blip r:embed="rId2">
+            <a:extLst>
+              <a:ext uri="{28A0092B-C50C-407E-A947-70E740481C1C}">
+                <a14:useLocalDpi xmlns:a14="http://schemas.microsoft.com/office/drawing/2010/main" val="0"/>
+              </a:ext>
+            </a:extLst>
+          </a:blip>
+          <a:stretch>
+            <a:fillRect/>
+          </a:stretch>
+        </p:blipFill>
+        <p:spPr>
+          <a:xfrm>
+            <a:off x="3980091" y="3635497"/>
+            <a:ext cx="532758" cy="532758"/>
+          </a:xfrm>
+          <a:prstGeom prst="rect">
+            <a:avLst/>
+          </a:prstGeom>
+        </p:spPr>
+      </p:pic>
+      <p:pic>
+        <p:nvPicPr>
+          <p:cNvPr id="26" name="Picture 25" descr="Icon&#10;&#10;Description automatically generated">
+            <a:extLst>
+              <a:ext uri="{FF2B5EF4-FFF2-40B4-BE49-F238E27FC236}">
+                <a16:creationId xmlns:a16="http://schemas.microsoft.com/office/drawing/2014/main" id="{5F8BE3B3-B3E8-4BA5-95C4-7B0513FCD336}"/>
+              </a:ext>
+            </a:extLst>
+          </p:cNvPr>
+          <p:cNvPicPr>
+            <a:picLocks noChangeAspect="1"/>
+          </p:cNvPicPr>
+          <p:nvPr/>
+        </p:nvPicPr>
+        <p:blipFill>
+          <a:blip r:embed="rId3">
+            <a:extLst>
+              <a:ext uri="{28A0092B-C50C-407E-A947-70E740481C1C}">
+                <a14:useLocalDpi xmlns:a14="http://schemas.microsoft.com/office/drawing/2010/main" val="0"/>
+              </a:ext>
+            </a:extLst>
+          </a:blip>
+          <a:stretch>
+            <a:fillRect/>
+          </a:stretch>
+        </p:blipFill>
+        <p:spPr>
+          <a:xfrm>
+            <a:off x="6509590" y="3538230"/>
+            <a:ext cx="609640" cy="609640"/>
+          </a:xfrm>
+          <a:prstGeom prst="rect">
+            <a:avLst/>
+          </a:prstGeom>
+        </p:spPr>
+      </p:pic>
+      <p:pic>
+        <p:nvPicPr>
+          <p:cNvPr id="28" name="Picture 27" descr="Icon&#10;&#10;Description automatically generated">
+            <a:extLst>
+              <a:ext uri="{FF2B5EF4-FFF2-40B4-BE49-F238E27FC236}">
+                <a16:creationId xmlns:a16="http://schemas.microsoft.com/office/drawing/2014/main" id="{269FFA1E-EA4D-42A6-B27F-DFDA9D0A4077}"/>
+              </a:ext>
+            </a:extLst>
+          </p:cNvPr>
+          <p:cNvPicPr>
+            <a:picLocks noChangeAspect="1"/>
+          </p:cNvPicPr>
+          <p:nvPr/>
+        </p:nvPicPr>
+        <p:blipFill>
+          <a:blip r:embed="rId4">
+            <a:extLst>
+              <a:ext uri="{28A0092B-C50C-407E-A947-70E740481C1C}">
+                <a14:useLocalDpi xmlns:a14="http://schemas.microsoft.com/office/drawing/2010/main" val="0"/>
+              </a:ext>
+            </a:extLst>
+          </a:blip>
+          <a:stretch>
+            <a:fillRect/>
+          </a:stretch>
+        </p:blipFill>
+        <p:spPr>
+          <a:xfrm>
+            <a:off x="6180910" y="1645029"/>
+            <a:ext cx="633280" cy="633280"/>
+          </a:xfrm>
+          <a:prstGeom prst="rect">
+            <a:avLst/>
+          </a:prstGeom>
+        </p:spPr>
+      </p:pic>
+      <p:pic>
+        <p:nvPicPr>
+          <p:cNvPr id="30" name="Picture 29" descr="Icon&#10;&#10;Description automatically generated with medium confidence">
+            <a:extLst>
+              <a:ext uri="{FF2B5EF4-FFF2-40B4-BE49-F238E27FC236}">
+                <a16:creationId xmlns:a16="http://schemas.microsoft.com/office/drawing/2014/main" id="{F7350A8F-8930-4319-8639-115BEB038540}"/>
+              </a:ext>
+            </a:extLst>
+          </p:cNvPr>
+          <p:cNvPicPr>
+            <a:picLocks noChangeAspect="1"/>
+          </p:cNvPicPr>
+          <p:nvPr/>
+        </p:nvPicPr>
+        <p:blipFill>
+          <a:blip r:embed="rId5">
+            <a:extLst>
+              <a:ext uri="{28A0092B-C50C-407E-A947-70E740481C1C}">
+                <a14:useLocalDpi xmlns:a14="http://schemas.microsoft.com/office/drawing/2010/main" val="0"/>
+              </a:ext>
+            </a:extLst>
+          </a:blip>
+          <a:stretch>
+            <a:fillRect/>
+          </a:stretch>
+        </p:blipFill>
+        <p:spPr>
+          <a:xfrm>
+            <a:off x="3952907" y="1547489"/>
+            <a:ext cx="457724" cy="457724"/>
+          </a:xfrm>
+          <a:prstGeom prst="rect">
+            <a:avLst/>
+          </a:prstGeom>
+        </p:spPr>
+      </p:pic>
+      <p:sp>
+        <p:nvSpPr>
+          <p:cNvPr id="5" name="Frame 4">
+            <a:extLst>
+              <a:ext uri="{FF2B5EF4-FFF2-40B4-BE49-F238E27FC236}">
+                <a16:creationId xmlns:a16="http://schemas.microsoft.com/office/drawing/2014/main" id="{048FB26F-14DD-4195-9FAD-25A773E07C8F}"/>
+              </a:ext>
+            </a:extLst>
+          </p:cNvPr>
+          <p:cNvSpPr/>
+          <p:nvPr/>
+        </p:nvSpPr>
+        <p:spPr>
+          <a:xfrm>
+            <a:off x="2727004" y="949732"/>
+            <a:ext cx="2844796" cy="1710861"/>
+          </a:xfrm>
+          <a:prstGeom prst="frame">
+            <a:avLst>
+              <a:gd name="adj1" fmla="val 5152"/>
+            </a:avLst>
+          </a:prstGeom>
+          <a:solidFill>
+            <a:srgbClr val="0070C0">
+              <a:alpha val="49000"/>
+            </a:srgbClr>
+          </a:solidFill>
+        </p:spPr>
+        <p:style>
+          <a:lnRef idx="2">
+            <a:schemeClr val="accent1">
+              <a:shade val="50000"/>
+            </a:schemeClr>
+          </a:lnRef>
+          <a:fillRef idx="1">
+            <a:schemeClr val="accent1"/>
+          </a:fillRef>
+          <a:effectRef idx="0">
+            <a:schemeClr val="accent1"/>
+          </a:effectRef>
+          <a:fontRef idx="minor">
+            <a:schemeClr val="lt1"/>
+          </a:fontRef>
+        </p:style>
+        <p:txBody>
+          <a:bodyPr rtlCol="0" anchor="ctr"/>
+          <a:lstStyle/>
+          <a:p>
+            <a:pPr algn="ctr"/>
+            <a:endParaRPr lang="en-US">
+              <a:solidFill>
+                <a:schemeClr val="tx1"/>
+              </a:solidFill>
+            </a:endParaRPr>
+          </a:p>
+        </p:txBody>
+      </p:sp>
+      <p:sp>
+        <p:nvSpPr>
+          <p:cNvPr id="67" name="Frame 66">
+            <a:extLst>
+              <a:ext uri="{FF2B5EF4-FFF2-40B4-BE49-F238E27FC236}">
+                <a16:creationId xmlns:a16="http://schemas.microsoft.com/office/drawing/2014/main" id="{0CDF8136-FA3C-4680-8DAA-1E73DD49ADB2}"/>
+              </a:ext>
+            </a:extLst>
+          </p:cNvPr>
+          <p:cNvSpPr/>
+          <p:nvPr/>
+        </p:nvSpPr>
+        <p:spPr>
+          <a:xfrm>
+            <a:off x="1699525" y="2702984"/>
+            <a:ext cx="2844796" cy="1710861"/>
+          </a:xfrm>
+          <a:prstGeom prst="frame">
+            <a:avLst>
+              <a:gd name="adj1" fmla="val 5152"/>
+            </a:avLst>
+          </a:prstGeom>
+          <a:solidFill>
+            <a:srgbClr val="0070C0">
+              <a:alpha val="49000"/>
+            </a:srgbClr>
+          </a:solidFill>
+        </p:spPr>
+        <p:style>
+          <a:lnRef idx="2">
+            <a:schemeClr val="accent1">
+              <a:shade val="50000"/>
+            </a:schemeClr>
+          </a:lnRef>
+          <a:fillRef idx="1">
+            <a:schemeClr val="accent1"/>
+          </a:fillRef>
+          <a:effectRef idx="0">
+            <a:schemeClr val="accent1"/>
+          </a:effectRef>
+          <a:fontRef idx="minor">
+            <a:schemeClr val="lt1"/>
+          </a:fontRef>
+        </p:style>
+        <p:txBody>
+          <a:bodyPr rtlCol="0" anchor="ctr"/>
+          <a:lstStyle/>
+          <a:p>
+            <a:pPr algn="ctr"/>
+            <a:endParaRPr lang="en-US">
+              <a:solidFill>
+                <a:schemeClr val="tx1"/>
+              </a:solidFill>
+            </a:endParaRPr>
+          </a:p>
+        </p:txBody>
+      </p:sp>
+      <p:sp>
+        <p:nvSpPr>
+          <p:cNvPr id="69" name="Frame 68">
+            <a:extLst>
+              <a:ext uri="{FF2B5EF4-FFF2-40B4-BE49-F238E27FC236}">
+                <a16:creationId xmlns:a16="http://schemas.microsoft.com/office/drawing/2014/main" id="{0603BD8A-C52B-40D6-8777-8FC7B0AC1CDB}"/>
+              </a:ext>
+            </a:extLst>
+          </p:cNvPr>
+          <p:cNvSpPr/>
+          <p:nvPr/>
+        </p:nvSpPr>
+        <p:spPr>
+          <a:xfrm>
+            <a:off x="4593214" y="2710430"/>
+            <a:ext cx="2844796" cy="1710861"/>
+          </a:xfrm>
+          <a:prstGeom prst="frame">
+            <a:avLst>
+              <a:gd name="adj1" fmla="val 5152"/>
+            </a:avLst>
+          </a:prstGeom>
+          <a:solidFill>
+            <a:srgbClr val="0070C0">
+              <a:alpha val="49000"/>
+            </a:srgbClr>
+          </a:solidFill>
+        </p:spPr>
+        <p:style>
+          <a:lnRef idx="2">
+            <a:schemeClr val="accent1">
+              <a:shade val="50000"/>
+            </a:schemeClr>
+          </a:lnRef>
+          <a:fillRef idx="1">
+            <a:schemeClr val="accent1"/>
+          </a:fillRef>
+          <a:effectRef idx="0">
+            <a:schemeClr val="accent1"/>
+          </a:effectRef>
+          <a:fontRef idx="minor">
+            <a:schemeClr val="lt1"/>
+          </a:fontRef>
+        </p:style>
+        <p:txBody>
+          <a:bodyPr rtlCol="0" anchor="ctr"/>
+          <a:lstStyle/>
+          <a:p>
+            <a:pPr algn="ctr"/>
+            <a:endParaRPr lang="en-US">
+              <a:solidFill>
+                <a:schemeClr val="tx1"/>
+              </a:solidFill>
+            </a:endParaRPr>
+          </a:p>
+        </p:txBody>
+      </p:sp>
+    </p:spTree>
+    <p:extLst>
+      <p:ext uri="{BB962C8B-B14F-4D97-AF65-F5344CB8AC3E}">
+        <p14:creationId xmlns:p14="http://schemas.microsoft.com/office/powerpoint/2010/main" val="357328829"/>
+      </p:ext>
+    </p:extLst>
+  </p:cSld>
+  <p:clrMapOvr>
+    <a:masterClrMapping/>
+  </p:clrMapOvr>
+</p:sld>
+</file>
+
+<file path=ppt/slides/slide11.xml><?xml version="1.0" encoding="utf-8"?>
+<p:sld xmlns:a="http://schemas.openxmlformats.org/drawingml/2006/main" xmlns:r="http://schemas.openxmlformats.org/officeDocument/2006/relationships" xmlns:p="http://schemas.openxmlformats.org/presentationml/2006/main">
+  <p:cSld>
+    <p:spTree>
+      <p:nvGrpSpPr>
+        <p:cNvPr id="1" name=""/>
+        <p:cNvGrpSpPr/>
+        <p:nvPr/>
+      </p:nvGrpSpPr>
+      <p:grpSpPr>
+        <a:xfrm>
+          <a:off x="0" y="0"/>
+          <a:ext cx="0" cy="0"/>
+          <a:chOff x="0" y="0"/>
+          <a:chExt cx="0" cy="0"/>
+        </a:xfrm>
+      </p:grpSpPr>
       <p:grpSp>
         <p:nvGrpSpPr>
           <p:cNvPr id="2050" name="Group 49">
@@ -14229,7 +16869,7 @@
 </p:sld>
 </file>
 
-<file path=ppt/slides/slide11.xml><?xml version="1.0" encoding="utf-8"?>
+<file path=ppt/slides/slide12.xml><?xml version="1.0" encoding="utf-8"?>
 <p:sld xmlns:a="http://schemas.openxmlformats.org/drawingml/2006/main" xmlns:r="http://schemas.openxmlformats.org/officeDocument/2006/relationships" xmlns:p="http://schemas.openxmlformats.org/presentationml/2006/main">
   <p:cSld>
     <p:spTree>

</xml_diff>

<commit_message>
Changed pptx file in docs
</commit_message>
<xml_diff>
--- a/Documentation/House_model_References/Pictures/New Microsoft PowerPoint Presentation.pptx
+++ b/Documentation/House_model_References/Pictures/New Microsoft PowerPoint Presentation.pptx
@@ -19,6 +19,7 @@
     <p:sldId id="269" r:id="rId13"/>
     <p:sldId id="261" r:id="rId14"/>
     <p:sldId id="262" r:id="rId15"/>
+    <p:sldId id="270" r:id="rId16"/>
   </p:sldIdLst>
   <p:sldSz cx="12192000" cy="6858000"/>
   <p:notesSz cx="6858000" cy="9144000"/>
@@ -274,7 +275,7 @@
           <a:p>
             <a:fld id="{FA475539-8058-4AF7-AB80-639FE4A10C76}" type="datetimeFigureOut">
               <a:rPr lang="en-NL" smtClean="0"/>
-              <a:t>09/06/2021</a:t>
+              <a:t>7 Apr 2022</a:t>
             </a:fld>
             <a:endParaRPr lang="en-NL"/>
           </a:p>
@@ -474,7 +475,7 @@
           <a:p>
             <a:fld id="{FA475539-8058-4AF7-AB80-639FE4A10C76}" type="datetimeFigureOut">
               <a:rPr lang="en-NL" smtClean="0"/>
-              <a:t>09/06/2021</a:t>
+              <a:t>7 Apr 2022</a:t>
             </a:fld>
             <a:endParaRPr lang="en-NL"/>
           </a:p>
@@ -684,7 +685,7 @@
           <a:p>
             <a:fld id="{FA475539-8058-4AF7-AB80-639FE4A10C76}" type="datetimeFigureOut">
               <a:rPr lang="en-NL" smtClean="0"/>
-              <a:t>09/06/2021</a:t>
+              <a:t>7 Apr 2022</a:t>
             </a:fld>
             <a:endParaRPr lang="en-NL"/>
           </a:p>
@@ -884,7 +885,7 @@
           <a:p>
             <a:fld id="{FA475539-8058-4AF7-AB80-639FE4A10C76}" type="datetimeFigureOut">
               <a:rPr lang="en-NL" smtClean="0"/>
-              <a:t>09/06/2021</a:t>
+              <a:t>7 Apr 2022</a:t>
             </a:fld>
             <a:endParaRPr lang="en-NL"/>
           </a:p>
@@ -1160,7 +1161,7 @@
           <a:p>
             <a:fld id="{FA475539-8058-4AF7-AB80-639FE4A10C76}" type="datetimeFigureOut">
               <a:rPr lang="en-NL" smtClean="0"/>
-              <a:t>09/06/2021</a:t>
+              <a:t>7 Apr 2022</a:t>
             </a:fld>
             <a:endParaRPr lang="en-NL"/>
           </a:p>
@@ -1428,7 +1429,7 @@
           <a:p>
             <a:fld id="{FA475539-8058-4AF7-AB80-639FE4A10C76}" type="datetimeFigureOut">
               <a:rPr lang="en-NL" smtClean="0"/>
-              <a:t>09/06/2021</a:t>
+              <a:t>7 Apr 2022</a:t>
             </a:fld>
             <a:endParaRPr lang="en-NL"/>
           </a:p>
@@ -1843,7 +1844,7 @@
           <a:p>
             <a:fld id="{FA475539-8058-4AF7-AB80-639FE4A10C76}" type="datetimeFigureOut">
               <a:rPr lang="en-NL" smtClean="0"/>
-              <a:t>09/06/2021</a:t>
+              <a:t>7 Apr 2022</a:t>
             </a:fld>
             <a:endParaRPr lang="en-NL"/>
           </a:p>
@@ -1985,7 +1986,7 @@
           <a:p>
             <a:fld id="{FA475539-8058-4AF7-AB80-639FE4A10C76}" type="datetimeFigureOut">
               <a:rPr lang="en-NL" smtClean="0"/>
-              <a:t>09/06/2021</a:t>
+              <a:t>7 Apr 2022</a:t>
             </a:fld>
             <a:endParaRPr lang="en-NL"/>
           </a:p>
@@ -2098,7 +2099,7 @@
           <a:p>
             <a:fld id="{FA475539-8058-4AF7-AB80-639FE4A10C76}" type="datetimeFigureOut">
               <a:rPr lang="en-NL" smtClean="0"/>
-              <a:t>09/06/2021</a:t>
+              <a:t>7 Apr 2022</a:t>
             </a:fld>
             <a:endParaRPr lang="en-NL"/>
           </a:p>
@@ -2411,7 +2412,7 @@
           <a:p>
             <a:fld id="{FA475539-8058-4AF7-AB80-639FE4A10C76}" type="datetimeFigureOut">
               <a:rPr lang="en-NL" smtClean="0"/>
-              <a:t>09/06/2021</a:t>
+              <a:t>7 Apr 2022</a:t>
             </a:fld>
             <a:endParaRPr lang="en-NL"/>
           </a:p>
@@ -2700,7 +2701,7 @@
           <a:p>
             <a:fld id="{FA475539-8058-4AF7-AB80-639FE4A10C76}" type="datetimeFigureOut">
               <a:rPr lang="en-NL" smtClean="0"/>
-              <a:t>09/06/2021</a:t>
+              <a:t>7 Apr 2022</a:t>
             </a:fld>
             <a:endParaRPr lang="en-NL"/>
           </a:p>
@@ -2943,7 +2944,7 @@
           <a:p>
             <a:fld id="{FA475539-8058-4AF7-AB80-639FE4A10C76}" type="datetimeFigureOut">
               <a:rPr lang="en-NL" smtClean="0"/>
-              <a:t>09/06/2021</a:t>
+              <a:t>7 Apr 2022</a:t>
             </a:fld>
             <a:endParaRPr lang="en-NL"/>
           </a:p>
@@ -43011,6 +43012,66 @@
 </p:sld>
 </file>
 
+<file path=ppt/slides/slide15.xml><?xml version="1.0" encoding="utf-8"?>
+<p:sld xmlns:a="http://schemas.openxmlformats.org/drawingml/2006/main" xmlns:r="http://schemas.openxmlformats.org/officeDocument/2006/relationships" xmlns:p="http://schemas.openxmlformats.org/presentationml/2006/main">
+  <p:cSld>
+    <p:spTree>
+      <p:nvGrpSpPr>
+        <p:cNvPr id="1" name=""/>
+        <p:cNvGrpSpPr/>
+        <p:nvPr/>
+      </p:nvGrpSpPr>
+      <p:grpSpPr>
+        <a:xfrm>
+          <a:off x="0" y="0"/>
+          <a:ext cx="0" cy="0"/>
+          <a:chOff x="0" y="0"/>
+          <a:chExt cx="0" cy="0"/>
+        </a:xfrm>
+      </p:grpSpPr>
+      <p:pic>
+        <p:nvPicPr>
+          <p:cNvPr id="5" name="Picture 4">
+            <a:extLst>
+              <a:ext uri="{FF2B5EF4-FFF2-40B4-BE49-F238E27FC236}">
+                <a16:creationId xmlns:a16="http://schemas.microsoft.com/office/drawing/2014/main" id="{63B9C31D-24CF-4A5C-8E93-720F2F55D722}"/>
+              </a:ext>
+            </a:extLst>
+          </p:cNvPr>
+          <p:cNvPicPr>
+            <a:picLocks noChangeAspect="1"/>
+          </p:cNvPicPr>
+          <p:nvPr/>
+        </p:nvPicPr>
+        <p:blipFill>
+          <a:blip r:embed="rId2"/>
+          <a:stretch>
+            <a:fillRect/>
+          </a:stretch>
+        </p:blipFill>
+        <p:spPr>
+          <a:xfrm>
+            <a:off x="673417" y="422910"/>
+            <a:ext cx="5607786" cy="3497580"/>
+          </a:xfrm>
+          <a:prstGeom prst="rect">
+            <a:avLst/>
+          </a:prstGeom>
+        </p:spPr>
+      </p:pic>
+    </p:spTree>
+    <p:extLst>
+      <p:ext uri="{BB962C8B-B14F-4D97-AF65-F5344CB8AC3E}">
+        <p14:creationId xmlns:p14="http://schemas.microsoft.com/office/powerpoint/2010/main" val="3134794060"/>
+      </p:ext>
+    </p:extLst>
+  </p:cSld>
+  <p:clrMapOvr>
+    <a:masterClrMapping/>
+  </p:clrMapOvr>
+</p:sld>
+</file>
+
 <file path=ppt/slides/slide2.xml><?xml version="1.0" encoding="utf-8"?>
 <p:sld xmlns:a="http://schemas.openxmlformats.org/drawingml/2006/main" xmlns:r="http://schemas.openxmlformats.org/officeDocument/2006/relationships" xmlns:p="http://schemas.openxmlformats.org/presentationml/2006/main">
   <p:cSld>

</xml_diff>

<commit_message>
Changes from 25 May (PvK, MJ)
</commit_message>
<xml_diff>
--- a/Documentation/House_model_References/Pictures/New Microsoft PowerPoint Presentation.pptx
+++ b/Documentation/House_model_References/Pictures/New Microsoft PowerPoint Presentation.pptx
@@ -19,6 +19,7 @@
     <p:sldId id="269" r:id="rId13"/>
     <p:sldId id="261" r:id="rId14"/>
     <p:sldId id="262" r:id="rId15"/>
+    <p:sldId id="270" r:id="rId16"/>
   </p:sldIdLst>
   <p:sldSz cx="12192000" cy="6858000"/>
   <p:notesSz cx="6858000" cy="9144000"/>
@@ -274,7 +275,7 @@
           <a:p>
             <a:fld id="{FA475539-8058-4AF7-AB80-639FE4A10C76}" type="datetimeFigureOut">
               <a:rPr lang="en-NL" smtClean="0"/>
-              <a:t>09/06/2021</a:t>
+              <a:t>23 May 2022</a:t>
             </a:fld>
             <a:endParaRPr lang="en-NL"/>
           </a:p>
@@ -474,7 +475,7 @@
           <a:p>
             <a:fld id="{FA475539-8058-4AF7-AB80-639FE4A10C76}" type="datetimeFigureOut">
               <a:rPr lang="en-NL" smtClean="0"/>
-              <a:t>09/06/2021</a:t>
+              <a:t>23 May 2022</a:t>
             </a:fld>
             <a:endParaRPr lang="en-NL"/>
           </a:p>
@@ -684,7 +685,7 @@
           <a:p>
             <a:fld id="{FA475539-8058-4AF7-AB80-639FE4A10C76}" type="datetimeFigureOut">
               <a:rPr lang="en-NL" smtClean="0"/>
-              <a:t>09/06/2021</a:t>
+              <a:t>23 May 2022</a:t>
             </a:fld>
             <a:endParaRPr lang="en-NL"/>
           </a:p>
@@ -884,7 +885,7 @@
           <a:p>
             <a:fld id="{FA475539-8058-4AF7-AB80-639FE4A10C76}" type="datetimeFigureOut">
               <a:rPr lang="en-NL" smtClean="0"/>
-              <a:t>09/06/2021</a:t>
+              <a:t>23 May 2022</a:t>
             </a:fld>
             <a:endParaRPr lang="en-NL"/>
           </a:p>
@@ -1160,7 +1161,7 @@
           <a:p>
             <a:fld id="{FA475539-8058-4AF7-AB80-639FE4A10C76}" type="datetimeFigureOut">
               <a:rPr lang="en-NL" smtClean="0"/>
-              <a:t>09/06/2021</a:t>
+              <a:t>23 May 2022</a:t>
             </a:fld>
             <a:endParaRPr lang="en-NL"/>
           </a:p>
@@ -1428,7 +1429,7 @@
           <a:p>
             <a:fld id="{FA475539-8058-4AF7-AB80-639FE4A10C76}" type="datetimeFigureOut">
               <a:rPr lang="en-NL" smtClean="0"/>
-              <a:t>09/06/2021</a:t>
+              <a:t>23 May 2022</a:t>
             </a:fld>
             <a:endParaRPr lang="en-NL"/>
           </a:p>
@@ -1843,7 +1844,7 @@
           <a:p>
             <a:fld id="{FA475539-8058-4AF7-AB80-639FE4A10C76}" type="datetimeFigureOut">
               <a:rPr lang="en-NL" smtClean="0"/>
-              <a:t>09/06/2021</a:t>
+              <a:t>23 May 2022</a:t>
             </a:fld>
             <a:endParaRPr lang="en-NL"/>
           </a:p>
@@ -1985,7 +1986,7 @@
           <a:p>
             <a:fld id="{FA475539-8058-4AF7-AB80-639FE4A10C76}" type="datetimeFigureOut">
               <a:rPr lang="en-NL" smtClean="0"/>
-              <a:t>09/06/2021</a:t>
+              <a:t>23 May 2022</a:t>
             </a:fld>
             <a:endParaRPr lang="en-NL"/>
           </a:p>
@@ -2098,7 +2099,7 @@
           <a:p>
             <a:fld id="{FA475539-8058-4AF7-AB80-639FE4A10C76}" type="datetimeFigureOut">
               <a:rPr lang="en-NL" smtClean="0"/>
-              <a:t>09/06/2021</a:t>
+              <a:t>23 May 2022</a:t>
             </a:fld>
             <a:endParaRPr lang="en-NL"/>
           </a:p>
@@ -2411,7 +2412,7 @@
           <a:p>
             <a:fld id="{FA475539-8058-4AF7-AB80-639FE4A10C76}" type="datetimeFigureOut">
               <a:rPr lang="en-NL" smtClean="0"/>
-              <a:t>09/06/2021</a:t>
+              <a:t>23 May 2022</a:t>
             </a:fld>
             <a:endParaRPr lang="en-NL"/>
           </a:p>
@@ -2700,7 +2701,7 @@
           <a:p>
             <a:fld id="{FA475539-8058-4AF7-AB80-639FE4A10C76}" type="datetimeFigureOut">
               <a:rPr lang="en-NL" smtClean="0"/>
-              <a:t>09/06/2021</a:t>
+              <a:t>23 May 2022</a:t>
             </a:fld>
             <a:endParaRPr lang="en-NL"/>
           </a:p>
@@ -2943,7 +2944,7 @@
           <a:p>
             <a:fld id="{FA475539-8058-4AF7-AB80-639FE4A10C76}" type="datetimeFigureOut">
               <a:rPr lang="en-NL" smtClean="0"/>
-              <a:t>09/06/2021</a:t>
+              <a:t>23 May 2022</a:t>
             </a:fld>
             <a:endParaRPr lang="en-NL"/>
           </a:p>
@@ -43011,6 +43012,96 @@
 </p:sld>
 </file>
 
+<file path=ppt/slides/slide15.xml><?xml version="1.0" encoding="utf-8"?>
+<p:sld xmlns:a="http://schemas.openxmlformats.org/drawingml/2006/main" xmlns:r="http://schemas.openxmlformats.org/officeDocument/2006/relationships" xmlns:p="http://schemas.openxmlformats.org/presentationml/2006/main">
+  <p:cSld>
+    <p:spTree>
+      <p:nvGrpSpPr>
+        <p:cNvPr id="1" name=""/>
+        <p:cNvGrpSpPr/>
+        <p:nvPr/>
+      </p:nvGrpSpPr>
+      <p:grpSpPr>
+        <a:xfrm>
+          <a:off x="0" y="0"/>
+          <a:ext cx="0" cy="0"/>
+          <a:chOff x="0" y="0"/>
+          <a:chExt cx="0" cy="0"/>
+        </a:xfrm>
+      </p:grpSpPr>
+      <p:pic>
+        <p:nvPicPr>
+          <p:cNvPr id="2051" name="Picture 2050">
+            <a:extLst>
+              <a:ext uri="{FF2B5EF4-FFF2-40B4-BE49-F238E27FC236}">
+                <a16:creationId xmlns:a16="http://schemas.microsoft.com/office/drawing/2014/main" id="{FAA4F578-14D7-4A21-B4CB-0F97AD77A3F3}"/>
+              </a:ext>
+            </a:extLst>
+          </p:cNvPr>
+          <p:cNvPicPr>
+            <a:picLocks noChangeAspect="1"/>
+          </p:cNvPicPr>
+          <p:nvPr/>
+        </p:nvPicPr>
+        <p:blipFill>
+          <a:blip r:embed="rId2"/>
+          <a:stretch>
+            <a:fillRect/>
+          </a:stretch>
+        </p:blipFill>
+        <p:spPr>
+          <a:xfrm>
+            <a:off x="0" y="347662"/>
+            <a:ext cx="7286625" cy="6162675"/>
+          </a:xfrm>
+          <a:prstGeom prst="rect">
+            <a:avLst/>
+          </a:prstGeom>
+        </p:spPr>
+      </p:pic>
+      <p:pic>
+        <p:nvPicPr>
+          <p:cNvPr id="2053" name="Picture 2052">
+            <a:extLst>
+              <a:ext uri="{FF2B5EF4-FFF2-40B4-BE49-F238E27FC236}">
+                <a16:creationId xmlns:a16="http://schemas.microsoft.com/office/drawing/2014/main" id="{D00E65C2-75AA-4883-BA31-BE31683F4139}"/>
+              </a:ext>
+            </a:extLst>
+          </p:cNvPr>
+          <p:cNvPicPr>
+            <a:picLocks noChangeAspect="1"/>
+          </p:cNvPicPr>
+          <p:nvPr/>
+        </p:nvPicPr>
+        <p:blipFill>
+          <a:blip r:embed="rId3"/>
+          <a:stretch>
+            <a:fillRect/>
+          </a:stretch>
+        </p:blipFill>
+        <p:spPr>
+          <a:xfrm>
+            <a:off x="7971258" y="857056"/>
+            <a:ext cx="2762250" cy="2419350"/>
+          </a:xfrm>
+          <a:prstGeom prst="rect">
+            <a:avLst/>
+          </a:prstGeom>
+        </p:spPr>
+      </p:pic>
+    </p:spTree>
+    <p:extLst>
+      <p:ext uri="{BB962C8B-B14F-4D97-AF65-F5344CB8AC3E}">
+        <p14:creationId xmlns:p14="http://schemas.microsoft.com/office/powerpoint/2010/main" val="297515082"/>
+      </p:ext>
+    </p:extLst>
+  </p:cSld>
+  <p:clrMapOvr>
+    <a:masterClrMapping/>
+  </p:clrMapOvr>
+</p:sld>
+</file>
+
 <file path=ppt/slides/slide2.xml><?xml version="1.0" encoding="utf-8"?>
 <p:sld xmlns:a="http://schemas.openxmlformats.org/drawingml/2006/main" xmlns:r="http://schemas.openxmlformats.org/officeDocument/2006/relationships" xmlns:p="http://schemas.openxmlformats.org/presentationml/2006/main">
   <p:cSld>

</xml_diff>